<commit_message>
A few tweaks to the week 4 presentation
</commit_message>
<xml_diff>
--- a/presentations/XamarinForms-Week4.pptx
+++ b/presentations/XamarinForms-Week4.pptx
@@ -5,7 +5,7 @@
     <p:sldMasterId id="2147483648" r:id="rId4"/>
   </p:sldMasterIdLst>
   <p:notesMasterIdLst>
-    <p:notesMasterId r:id="rId23"/>
+    <p:notesMasterId r:id="rId31"/>
   </p:notesMasterIdLst>
   <p:sldIdLst>
     <p:sldId id="476" r:id="rId5"/>
@@ -23,9 +23,17 @@
     <p:sldId id="565" r:id="rId17"/>
     <p:sldId id="566" r:id="rId18"/>
     <p:sldId id="567" r:id="rId19"/>
-    <p:sldId id="568" r:id="rId20"/>
-    <p:sldId id="534" r:id="rId21"/>
-    <p:sldId id="308" r:id="rId22"/>
+    <p:sldId id="569" r:id="rId20"/>
+    <p:sldId id="568" r:id="rId21"/>
+    <p:sldId id="570" r:id="rId22"/>
+    <p:sldId id="571" r:id="rId23"/>
+    <p:sldId id="572" r:id="rId24"/>
+    <p:sldId id="573" r:id="rId25"/>
+    <p:sldId id="574" r:id="rId26"/>
+    <p:sldId id="575" r:id="rId27"/>
+    <p:sldId id="576" r:id="rId28"/>
+    <p:sldId id="534" r:id="rId29"/>
+    <p:sldId id="308" r:id="rId30"/>
   </p:sldIdLst>
   <p:sldSz cx="12192000" cy="6858000"/>
   <p:notesSz cx="6858000" cy="9144000"/>
@@ -663,6 +671,90 @@
     <p:extLst>
       <p:ext uri="{BB962C8B-B14F-4D97-AF65-F5344CB8AC3E}">
         <p14:creationId xmlns:p14="http://schemas.microsoft.com/office/powerpoint/2010/main" val="2027544019"/>
+      </p:ext>
+    </p:extLst>
+  </p:cSld>
+  <p:clrMapOvr>
+    <a:masterClrMapping/>
+  </p:clrMapOvr>
+</p:notes>
+</file>
+
+<file path=ppt/notesSlides/notesSlide3.xml><?xml version="1.0" encoding="utf-8"?>
+<p:notes xmlns:a="http://schemas.openxmlformats.org/drawingml/2006/main" xmlns:r="http://schemas.openxmlformats.org/officeDocument/2006/relationships" xmlns:p="http://schemas.openxmlformats.org/presentationml/2006/main">
+  <p:cSld>
+    <p:spTree>
+      <p:nvGrpSpPr>
+        <p:cNvPr id="1" name=""/>
+        <p:cNvGrpSpPr/>
+        <p:nvPr/>
+      </p:nvGrpSpPr>
+      <p:grpSpPr>
+        <a:xfrm>
+          <a:off x="0" y="0"/>
+          <a:ext cx="0" cy="0"/>
+          <a:chOff x="0" y="0"/>
+          <a:chExt cx="0" cy="0"/>
+        </a:xfrm>
+      </p:grpSpPr>
+      <p:sp>
+        <p:nvSpPr>
+          <p:cNvPr id="2" name="Slide Image Placeholder 1"/>
+          <p:cNvSpPr>
+            <a:spLocks noGrp="1" noRot="1" noChangeAspect="1"/>
+          </p:cNvSpPr>
+          <p:nvPr>
+            <p:ph type="sldImg"/>
+          </p:nvPr>
+        </p:nvSpPr>
+        <p:spPr/>
+      </p:sp>
+      <p:sp>
+        <p:nvSpPr>
+          <p:cNvPr id="3" name="Notes Placeholder 2"/>
+          <p:cNvSpPr>
+            <a:spLocks noGrp="1"/>
+          </p:cNvSpPr>
+          <p:nvPr>
+            <p:ph type="body" idx="1"/>
+          </p:nvPr>
+        </p:nvSpPr>
+        <p:spPr/>
+        <p:txBody>
+          <a:bodyPr/>
+          <a:lstStyle/>
+          <a:p>
+            <a:endParaRPr lang="en-US" dirty="0"/>
+          </a:p>
+        </p:txBody>
+      </p:sp>
+      <p:sp>
+        <p:nvSpPr>
+          <p:cNvPr id="4" name="Slide Number Placeholder 3"/>
+          <p:cNvSpPr>
+            <a:spLocks noGrp="1"/>
+          </p:cNvSpPr>
+          <p:nvPr>
+            <p:ph type="sldNum" sz="quarter" idx="5"/>
+          </p:nvPr>
+        </p:nvSpPr>
+        <p:spPr/>
+        <p:txBody>
+          <a:bodyPr/>
+          <a:lstStyle/>
+          <a:p>
+            <a:fld id="{4E8BADB7-1FBB-B74E-B90C-DA1567BD042E}" type="slidenum">
+              <a:rPr lang="en-US" smtClean="0"/>
+              <a:t>24</a:t>
+            </a:fld>
+            <a:endParaRPr lang="en-US"/>
+          </a:p>
+        </p:txBody>
+      </p:sp>
+    </p:spTree>
+    <p:extLst>
+      <p:ext uri="{BB962C8B-B14F-4D97-AF65-F5344CB8AC3E}">
+        <p14:creationId xmlns:p14="http://schemas.microsoft.com/office/powerpoint/2010/main" val="4040316455"/>
       </p:ext>
     </p:extLst>
   </p:cSld>
@@ -5734,7 +5826,7 @@
             </a:r>
             <a:r>
               <a:rPr lang="en-US" dirty="0"/>
-              <a:t> can only be bound to one item, usually the property they are converting</a:t>
+              <a:t> can only be bound to one item and an object parameter</a:t>
             </a:r>
           </a:p>
         </p:txBody>
@@ -5782,7 +5874,7 @@
           <a:p>
             <a:r>
               <a:rPr lang="en-US" dirty="0"/>
-              <a:t>This causes problems when two or more properties are needed for conversion</a:t>
+              <a:t>This causes problems when two or more properties are needed for conversion and both could update</a:t>
             </a:r>
           </a:p>
         </p:txBody>
@@ -5865,21 +5957,8 @@
           <a:p>
             <a:r>
               <a:rPr lang="en-US" dirty="0"/>
-              <a:t>Enter the </a:t>
-            </a:r>
-            <a:r>
-              <a:rPr lang="en-US" dirty="0" err="1"/>
-              <a:t>ViewModel</a:t>
-            </a:r>
-            <a:r>
-              <a:rPr lang="en-US" dirty="0"/>
-              <a:t>/Model/Interface specific </a:t>
-            </a:r>
-            <a:r>
-              <a:rPr lang="en-US" dirty="0" err="1"/>
-              <a:t>ValueConverter</a:t>
-            </a:r>
-            <a:endParaRPr lang="en-US" dirty="0"/>
+              <a:t>Bindable properties CAN be added and bound to in a value converter</a:t>
+            </a:r>
           </a:p>
         </p:txBody>
       </p:sp>
@@ -5925,16 +6004,12 @@
           <a:lstStyle/>
           <a:p>
             <a:r>
-              <a:rPr lang="en-US" dirty="0"/>
-              <a:t>Properties can be bound to objects where a </a:t>
-            </a:r>
-            <a:r>
               <a:rPr lang="en-US" dirty="0" err="1"/>
-              <a:t>ValueConverter</a:t>
-            </a:r>
-            <a:r>
-              <a:rPr lang="en-US" dirty="0"/>
-              <a:t> uses multiple properties to determine what to use </a:t>
+              <a:t>ValueConverters</a:t>
+            </a:r>
+            <a:r>
+              <a:rPr lang="en-US" dirty="0"/>
+              <a:t> are not part of the view stack so won’t inherit Source information</a:t>
             </a:r>
           </a:p>
         </p:txBody>
@@ -6098,7 +6173,7 @@
           <p:cNvPr id="2" name="Content Placeholder 1">
             <a:extLst>
               <a:ext uri="{FF2B5EF4-FFF2-40B4-BE49-F238E27FC236}">
-                <a16:creationId xmlns:a16="http://schemas.microsoft.com/office/drawing/2014/main" id="{3B3EA67C-6F4B-074D-977A-0F42659CC37A}"/>
+                <a16:creationId xmlns:a16="http://schemas.microsoft.com/office/drawing/2014/main" id="{D0165CB8-56F6-E242-A568-B9E19397D6A5}"/>
               </a:ext>
             </a:extLst>
           </p:cNvPr>
@@ -6111,19 +6186,189 @@
         </p:nvSpPr>
         <p:spPr/>
         <p:txBody>
-          <a:bodyPr anchor="ctr"/>
-          <a:lstStyle/>
-          <a:p>
-            <a:pPr marL="0" indent="0" algn="ctr">
+          <a:bodyPr/>
+          <a:lstStyle/>
+          <a:p>
+            <a:pPr marL="0" indent="0">
               <a:buNone/>
             </a:pPr>
             <a:r>
               <a:rPr lang="en-US" dirty="0"/>
-              <a:t>Demo 4: </a:t>
+              <a:t>&lt;</a:t>
             </a:r>
             <a:r>
               <a:rPr lang="en-US" dirty="0" err="1"/>
-              <a:t>ValueConverters</a:t>
+              <a:t>ContentPage.Resources</a:t>
+            </a:r>
+            <a:r>
+              <a:rPr lang="en-US" dirty="0"/>
+              <a:t>&gt; </a:t>
+            </a:r>
+          </a:p>
+          <a:p>
+            <a:pPr marL="0" indent="0">
+              <a:buNone/>
+            </a:pPr>
+            <a:r>
+              <a:rPr lang="en-US" dirty="0"/>
+              <a:t>    &lt;</a:t>
+            </a:r>
+            <a:r>
+              <a:rPr lang="en-US" dirty="0" err="1"/>
+              <a:t>ResourceDictionary</a:t>
+            </a:r>
+            <a:r>
+              <a:rPr lang="en-US" dirty="0"/>
+              <a:t>&gt; </a:t>
+            </a:r>
+          </a:p>
+          <a:p>
+            <a:pPr marL="0" indent="0">
+              <a:buNone/>
+            </a:pPr>
+            <a:r>
+              <a:rPr lang="en-US" dirty="0"/>
+              <a:t>        &lt;</a:t>
+            </a:r>
+            <a:r>
+              <a:rPr lang="en-US" dirty="0" err="1"/>
+              <a:t>local:myConverter</a:t>
+            </a:r>
+            <a:r>
+              <a:rPr lang="en-US" dirty="0"/>
+              <a:t> </a:t>
+            </a:r>
+            <a:r>
+              <a:rPr lang="en-US" dirty="0" err="1"/>
+              <a:t>x:Key</a:t>
+            </a:r>
+            <a:r>
+              <a:rPr lang="en-US" dirty="0"/>
+              <a:t>=”</a:t>
+            </a:r>
+            <a:r>
+              <a:rPr lang="en-US" dirty="0" err="1"/>
+              <a:t>ConverterType</a:t>
+            </a:r>
+            <a:r>
+              <a:rPr lang="en-US" dirty="0"/>
+              <a:t>" /&gt; </a:t>
+            </a:r>
+          </a:p>
+          <a:p>
+            <a:pPr marL="0" indent="0">
+              <a:buNone/>
+            </a:pPr>
+            <a:r>
+              <a:rPr lang="en-US" dirty="0"/>
+              <a:t>    &lt;/</a:t>
+            </a:r>
+            <a:r>
+              <a:rPr lang="en-US" dirty="0" err="1"/>
+              <a:t>ResourceDictionary</a:t>
+            </a:r>
+            <a:r>
+              <a:rPr lang="en-US" dirty="0"/>
+              <a:t>&gt; </a:t>
+            </a:r>
+          </a:p>
+          <a:p>
+            <a:pPr marL="0" indent="0">
+              <a:buNone/>
+            </a:pPr>
+            <a:r>
+              <a:rPr lang="en-US" dirty="0"/>
+              <a:t>&lt;/</a:t>
+            </a:r>
+            <a:r>
+              <a:rPr lang="en-US" dirty="0" err="1"/>
+              <a:t>ContentPage.Resources</a:t>
+            </a:r>
+            <a:r>
+              <a:rPr lang="en-US" dirty="0"/>
+              <a:t>&gt;</a:t>
+            </a:r>
+          </a:p>
+          <a:p>
+            <a:pPr marL="0" indent="0">
+              <a:buNone/>
+            </a:pPr>
+            <a:r>
+              <a:rPr lang="en-US" dirty="0"/>
+              <a:t>&lt;Button Text=”Save" </a:t>
+            </a:r>
+          </a:p>
+          <a:p>
+            <a:pPr marL="0" indent="0">
+              <a:buNone/>
+            </a:pPr>
+            <a:r>
+              <a:rPr lang="en-US" dirty="0"/>
+              <a:t>    </a:t>
+            </a:r>
+            <a:r>
+              <a:rPr lang="en-US" dirty="0" err="1"/>
+              <a:t>IsEnabled</a:t>
+            </a:r>
+            <a:r>
+              <a:rPr lang="en-US" dirty="0"/>
+              <a:t>="{Binding </a:t>
+            </a:r>
+            <a:r>
+              <a:rPr lang="en-US" dirty="0" err="1"/>
+              <a:t>MyProperty</a:t>
+            </a:r>
+            <a:r>
+              <a:rPr lang="en-US" dirty="0"/>
+              <a:t>, Converter={</a:t>
+            </a:r>
+            <a:r>
+              <a:rPr lang="en-US" dirty="0" err="1"/>
+              <a:t>StaticResource</a:t>
+            </a:r>
+            <a:r>
+              <a:rPr lang="en-US" dirty="0"/>
+              <a:t> </a:t>
+            </a:r>
+            <a:r>
+              <a:rPr lang="en-US" dirty="0" err="1"/>
+              <a:t>myConverter</a:t>
+            </a:r>
+            <a:r>
+              <a:rPr lang="en-US" dirty="0"/>
+              <a:t>}}" /&gt;</a:t>
+            </a:r>
+          </a:p>
+        </p:txBody>
+      </p:sp>
+      <p:sp>
+        <p:nvSpPr>
+          <p:cNvPr id="3" name="Title 2">
+            <a:extLst>
+              <a:ext uri="{FF2B5EF4-FFF2-40B4-BE49-F238E27FC236}">
+                <a16:creationId xmlns:a16="http://schemas.microsoft.com/office/drawing/2014/main" id="{89A521D2-DB9E-534D-9D14-AC1EE318268C}"/>
+              </a:ext>
+            </a:extLst>
+          </p:cNvPr>
+          <p:cNvSpPr>
+            <a:spLocks noGrp="1"/>
+          </p:cNvSpPr>
+          <p:nvPr>
+            <p:ph type="title"/>
+          </p:nvPr>
+        </p:nvSpPr>
+        <p:spPr/>
+        <p:txBody>
+          <a:bodyPr/>
+          <a:lstStyle/>
+          <a:p>
+            <a:r>
+              <a:rPr lang="en-US" dirty="0"/>
+              <a:t>Binding Syntax with a </a:t>
+            </a:r>
+            <a:r>
+              <a:rPr lang="en-US" dirty="0" err="1"/>
+              <a:t>ValueConverter</a:t>
             </a:r>
             <a:endParaRPr lang="en-US" dirty="0"/>
           </a:p>
@@ -6132,7 +6377,7 @@
     </p:spTree>
     <p:extLst>
       <p:ext uri="{BB962C8B-B14F-4D97-AF65-F5344CB8AC3E}">
-        <p14:creationId xmlns:p14="http://schemas.microsoft.com/office/powerpoint/2010/main" val="2937558278"/>
+        <p14:creationId xmlns:p14="http://schemas.microsoft.com/office/powerpoint/2010/main" val="1590283874"/>
       </p:ext>
     </p:extLst>
   </p:cSld>
@@ -6164,7 +6409,7 @@
           <p:cNvPr id="2" name="Content Placeholder 1">
             <a:extLst>
               <a:ext uri="{FF2B5EF4-FFF2-40B4-BE49-F238E27FC236}">
-                <a16:creationId xmlns:a16="http://schemas.microsoft.com/office/drawing/2014/main" id="{1C477145-6662-8147-9CC9-822B3280FF0D}"/>
+                <a16:creationId xmlns:a16="http://schemas.microsoft.com/office/drawing/2014/main" id="{3B3EA67C-6F4B-074D-977A-0F42659CC37A}"/>
               </a:ext>
             </a:extLst>
           </p:cNvPr>
@@ -6177,48 +6422,28 @@
         </p:nvSpPr>
         <p:spPr/>
         <p:txBody>
-          <a:bodyPr/>
-          <a:lstStyle/>
-          <a:p>
-            <a:r>
-              <a:rPr lang="en-US" dirty="0"/>
-              <a:t>Experiment with navigation</a:t>
-            </a:r>
-          </a:p>
-        </p:txBody>
-      </p:sp>
-      <p:sp>
-        <p:nvSpPr>
-          <p:cNvPr id="3" name="Title 2">
-            <a:extLst>
-              <a:ext uri="{FF2B5EF4-FFF2-40B4-BE49-F238E27FC236}">
-                <a16:creationId xmlns:a16="http://schemas.microsoft.com/office/drawing/2014/main" id="{934B4579-82D0-4845-952F-27348A280FF2}"/>
-              </a:ext>
-            </a:extLst>
-          </p:cNvPr>
-          <p:cNvSpPr>
-            <a:spLocks noGrp="1"/>
-          </p:cNvSpPr>
-          <p:nvPr>
-            <p:ph type="title"/>
-          </p:nvPr>
-        </p:nvSpPr>
-        <p:spPr/>
-        <p:txBody>
-          <a:bodyPr/>
-          <a:lstStyle/>
-          <a:p>
-            <a:r>
-              <a:rPr lang="en-US" dirty="0"/>
-              <a:t>Homework</a:t>
-            </a:r>
+          <a:bodyPr anchor="ctr"/>
+          <a:lstStyle/>
+          <a:p>
+            <a:pPr marL="0" indent="0" algn="ctr">
+              <a:buNone/>
+            </a:pPr>
+            <a:r>
+              <a:rPr lang="en-US" dirty="0"/>
+              <a:t>Demo 4: </a:t>
+            </a:r>
+            <a:r>
+              <a:rPr lang="en-US" dirty="0" err="1"/>
+              <a:t>ValueConverters</a:t>
+            </a:r>
+            <a:endParaRPr lang="en-US" dirty="0"/>
           </a:p>
         </p:txBody>
       </p:sp>
     </p:spTree>
     <p:extLst>
       <p:ext uri="{BB962C8B-B14F-4D97-AF65-F5344CB8AC3E}">
-        <p14:creationId xmlns:p14="http://schemas.microsoft.com/office/powerpoint/2010/main" val="3350403717"/>
+        <p14:creationId xmlns:p14="http://schemas.microsoft.com/office/powerpoint/2010/main" val="2937558278"/>
       </p:ext>
     </p:extLst>
   </p:cSld>
@@ -6247,10 +6472,10 @@
       </p:grpSpPr>
       <p:sp>
         <p:nvSpPr>
-          <p:cNvPr id="2" name="Title 1">
-            <a:extLst>
-              <a:ext uri="{FF2B5EF4-FFF2-40B4-BE49-F238E27FC236}">
-                <a16:creationId xmlns:a16="http://schemas.microsoft.com/office/drawing/2014/main" id="{806D7A72-3239-5742-844A-0446DAEC6607}"/>
+          <p:cNvPr id="3" name="Title 2">
+            <a:extLst>
+              <a:ext uri="{FF2B5EF4-FFF2-40B4-BE49-F238E27FC236}">
+                <a16:creationId xmlns:a16="http://schemas.microsoft.com/office/drawing/2014/main" id="{C3E49363-2F42-A844-8272-A4DE4251849C}"/>
               </a:ext>
             </a:extLst>
           </p:cNvPr>
@@ -6266,16 +6491,678 @@
           <a:bodyPr/>
           <a:lstStyle/>
           <a:p>
-            <a:endParaRPr lang="en-US"/>
-          </a:p>
-        </p:txBody>
-      </p:sp>
-      <p:sp>
-        <p:nvSpPr>
-          <p:cNvPr id="3" name="Content Placeholder 2">
-            <a:extLst>
-              <a:ext uri="{FF2B5EF4-FFF2-40B4-BE49-F238E27FC236}">
-                <a16:creationId xmlns:a16="http://schemas.microsoft.com/office/drawing/2014/main" id="{CB53C791-741A-D840-B1AE-33245AF3112C}"/>
+            <a:r>
+              <a:rPr lang="en-US" dirty="0"/>
+              <a:t>Creating your own views</a:t>
+            </a:r>
+          </a:p>
+        </p:txBody>
+      </p:sp>
+      <p:sp>
+        <p:nvSpPr>
+          <p:cNvPr id="4" name="Rectangle 3">
+            <a:extLst>
+              <a:ext uri="{FF2B5EF4-FFF2-40B4-BE49-F238E27FC236}">
+                <a16:creationId xmlns:a16="http://schemas.microsoft.com/office/drawing/2014/main" id="{4ACEACB3-FBC3-4144-8C24-4D5E9E5E0AE9}"/>
+              </a:ext>
+            </a:extLst>
+          </p:cNvPr>
+          <p:cNvSpPr/>
+          <p:nvPr/>
+        </p:nvSpPr>
+        <p:spPr>
+          <a:xfrm>
+            <a:off x="386499" y="1217354"/>
+            <a:ext cx="10989100" cy="685800"/>
+          </a:xfrm>
+          <a:prstGeom prst="rect">
+            <a:avLst/>
+          </a:prstGeom>
+        </p:spPr>
+        <p:style>
+          <a:lnRef idx="2">
+            <a:schemeClr val="accent1">
+              <a:shade val="50000"/>
+            </a:schemeClr>
+          </a:lnRef>
+          <a:fillRef idx="1">
+            <a:schemeClr val="accent1"/>
+          </a:fillRef>
+          <a:effectRef idx="0">
+            <a:schemeClr val="accent1"/>
+          </a:effectRef>
+          <a:fontRef idx="minor">
+            <a:schemeClr val="lt1"/>
+          </a:fontRef>
+        </p:style>
+        <p:txBody>
+          <a:bodyPr rtlCol="0" anchor="ctr"/>
+          <a:lstStyle/>
+          <a:p>
+            <a:r>
+              <a:rPr lang="en-US" dirty="0"/>
+              <a:t>Custom views are reusable controls that can be bound to</a:t>
+            </a:r>
+          </a:p>
+        </p:txBody>
+      </p:sp>
+      <p:sp>
+        <p:nvSpPr>
+          <p:cNvPr id="5" name="Rectangle 4">
+            <a:extLst>
+              <a:ext uri="{FF2B5EF4-FFF2-40B4-BE49-F238E27FC236}">
+                <a16:creationId xmlns:a16="http://schemas.microsoft.com/office/drawing/2014/main" id="{7616FA31-8DDF-E84E-A94D-531259EBF805}"/>
+              </a:ext>
+            </a:extLst>
+          </p:cNvPr>
+          <p:cNvSpPr/>
+          <p:nvPr/>
+        </p:nvSpPr>
+        <p:spPr>
+          <a:xfrm>
+            <a:off x="386499" y="2151727"/>
+            <a:ext cx="10989100" cy="685800"/>
+          </a:xfrm>
+          <a:prstGeom prst="rect">
+            <a:avLst/>
+          </a:prstGeom>
+        </p:spPr>
+        <p:style>
+          <a:lnRef idx="2">
+            <a:schemeClr val="accent1">
+              <a:shade val="50000"/>
+            </a:schemeClr>
+          </a:lnRef>
+          <a:fillRef idx="1">
+            <a:schemeClr val="accent1"/>
+          </a:fillRef>
+          <a:effectRef idx="0">
+            <a:schemeClr val="accent1"/>
+          </a:effectRef>
+          <a:fontRef idx="minor">
+            <a:schemeClr val="lt1"/>
+          </a:fontRef>
+        </p:style>
+        <p:txBody>
+          <a:bodyPr rtlCol="0" anchor="ctr"/>
+          <a:lstStyle/>
+          <a:p>
+            <a:r>
+              <a:rPr lang="en-US" dirty="0"/>
+              <a:t>If the view in turn contains other views it will be both the source and target of bindings</a:t>
+            </a:r>
+          </a:p>
+        </p:txBody>
+      </p:sp>
+      <p:sp>
+        <p:nvSpPr>
+          <p:cNvPr id="6" name="Rectangle 5">
+            <a:extLst>
+              <a:ext uri="{FF2B5EF4-FFF2-40B4-BE49-F238E27FC236}">
+                <a16:creationId xmlns:a16="http://schemas.microsoft.com/office/drawing/2014/main" id="{789023C1-3A4F-4B47-93CA-F3B426F94CB9}"/>
+              </a:ext>
+            </a:extLst>
+          </p:cNvPr>
+          <p:cNvSpPr/>
+          <p:nvPr/>
+        </p:nvSpPr>
+        <p:spPr>
+          <a:xfrm>
+            <a:off x="386499" y="3086100"/>
+            <a:ext cx="5344830" cy="685800"/>
+          </a:xfrm>
+          <a:prstGeom prst="rect">
+            <a:avLst/>
+          </a:prstGeom>
+        </p:spPr>
+        <p:style>
+          <a:lnRef idx="2">
+            <a:schemeClr val="accent1">
+              <a:shade val="50000"/>
+            </a:schemeClr>
+          </a:lnRef>
+          <a:fillRef idx="1">
+            <a:schemeClr val="accent1"/>
+          </a:fillRef>
+          <a:effectRef idx="0">
+            <a:schemeClr val="accent1"/>
+          </a:effectRef>
+          <a:fontRef idx="minor">
+            <a:schemeClr val="lt1"/>
+          </a:fontRef>
+        </p:style>
+        <p:txBody>
+          <a:bodyPr rtlCol="0" anchor="ctr"/>
+          <a:lstStyle/>
+          <a:p>
+            <a:r>
+              <a:rPr lang="en-US" dirty="0" err="1"/>
+              <a:t>this.BindingContext</a:t>
+            </a:r>
+            <a:r>
+              <a:rPr lang="en-US" dirty="0"/>
+              <a:t> set when used as a target</a:t>
+            </a:r>
+          </a:p>
+        </p:txBody>
+      </p:sp>
+      <p:sp>
+        <p:nvSpPr>
+          <p:cNvPr id="7" name="Rectangle 6">
+            <a:extLst>
+              <a:ext uri="{FF2B5EF4-FFF2-40B4-BE49-F238E27FC236}">
+                <a16:creationId xmlns:a16="http://schemas.microsoft.com/office/drawing/2014/main" id="{12A8F216-DD64-014D-BDCB-594F9D702C67}"/>
+              </a:ext>
+            </a:extLst>
+          </p:cNvPr>
+          <p:cNvSpPr/>
+          <p:nvPr/>
+        </p:nvSpPr>
+        <p:spPr>
+          <a:xfrm>
+            <a:off x="6030769" y="3086100"/>
+            <a:ext cx="5344830" cy="685800"/>
+          </a:xfrm>
+          <a:prstGeom prst="rect">
+            <a:avLst/>
+          </a:prstGeom>
+        </p:spPr>
+        <p:style>
+          <a:lnRef idx="2">
+            <a:schemeClr val="accent1">
+              <a:shade val="50000"/>
+            </a:schemeClr>
+          </a:lnRef>
+          <a:fillRef idx="1">
+            <a:schemeClr val="accent1"/>
+          </a:fillRef>
+          <a:effectRef idx="0">
+            <a:schemeClr val="accent1"/>
+          </a:effectRef>
+          <a:fontRef idx="minor">
+            <a:schemeClr val="lt1"/>
+          </a:fontRef>
+        </p:style>
+        <p:txBody>
+          <a:bodyPr rtlCol="0" anchor="ctr"/>
+          <a:lstStyle/>
+          <a:p>
+            <a:r>
+              <a:rPr lang="en-US" dirty="0" err="1"/>
+              <a:t>this.Content.BindingContext</a:t>
+            </a:r>
+            <a:r>
+              <a:rPr lang="en-US" dirty="0"/>
+              <a:t> set when used by internal views as a source</a:t>
+            </a:r>
+          </a:p>
+        </p:txBody>
+      </p:sp>
+      <p:sp>
+        <p:nvSpPr>
+          <p:cNvPr id="8" name="Rectangle 7">
+            <a:extLst>
+              <a:ext uri="{FF2B5EF4-FFF2-40B4-BE49-F238E27FC236}">
+                <a16:creationId xmlns:a16="http://schemas.microsoft.com/office/drawing/2014/main" id="{A85C32F7-FAE6-4340-9BCF-D5E5916F7835}"/>
+              </a:ext>
+            </a:extLst>
+          </p:cNvPr>
+          <p:cNvSpPr/>
+          <p:nvPr/>
+        </p:nvSpPr>
+        <p:spPr>
+          <a:xfrm>
+            <a:off x="6241973" y="4033157"/>
+            <a:ext cx="5143500" cy="2008414"/>
+          </a:xfrm>
+          <a:prstGeom prst="rect">
+            <a:avLst/>
+          </a:prstGeom>
+        </p:spPr>
+        <p:style>
+          <a:lnRef idx="2">
+            <a:schemeClr val="accent1">
+              <a:shade val="50000"/>
+            </a:schemeClr>
+          </a:lnRef>
+          <a:fillRef idx="1">
+            <a:schemeClr val="accent1"/>
+          </a:fillRef>
+          <a:effectRef idx="0">
+            <a:schemeClr val="accent1"/>
+          </a:effectRef>
+          <a:fontRef idx="minor">
+            <a:schemeClr val="lt1"/>
+          </a:fontRef>
+        </p:style>
+        <p:txBody>
+          <a:bodyPr rtlCol="0" anchor="t"/>
+          <a:lstStyle/>
+          <a:p>
+            <a:pPr algn="ctr"/>
+            <a:r>
+              <a:rPr lang="en-US" dirty="0"/>
+              <a:t>Container</a:t>
+            </a:r>
+          </a:p>
+        </p:txBody>
+      </p:sp>
+      <p:sp>
+        <p:nvSpPr>
+          <p:cNvPr id="9" name="Rectangle 8">
+            <a:extLst>
+              <a:ext uri="{FF2B5EF4-FFF2-40B4-BE49-F238E27FC236}">
+                <a16:creationId xmlns:a16="http://schemas.microsoft.com/office/drawing/2014/main" id="{3A3E2A9C-7121-F742-8AE8-32397A6783E0}"/>
+              </a:ext>
+            </a:extLst>
+          </p:cNvPr>
+          <p:cNvSpPr/>
+          <p:nvPr/>
+        </p:nvSpPr>
+        <p:spPr>
+          <a:xfrm>
+            <a:off x="6516837" y="4463142"/>
+            <a:ext cx="4607379" cy="1349829"/>
+          </a:xfrm>
+          <a:prstGeom prst="rect">
+            <a:avLst/>
+          </a:prstGeom>
+          <a:solidFill>
+            <a:schemeClr val="accent2">
+              <a:lumMod val="60000"/>
+              <a:lumOff val="40000"/>
+            </a:schemeClr>
+          </a:solidFill>
+        </p:spPr>
+        <p:style>
+          <a:lnRef idx="2">
+            <a:schemeClr val="accent1">
+              <a:shade val="50000"/>
+            </a:schemeClr>
+          </a:lnRef>
+          <a:fillRef idx="1">
+            <a:schemeClr val="accent1"/>
+          </a:fillRef>
+          <a:effectRef idx="0">
+            <a:schemeClr val="accent1"/>
+          </a:effectRef>
+          <a:fontRef idx="minor">
+            <a:schemeClr val="lt1"/>
+          </a:fontRef>
+        </p:style>
+        <p:txBody>
+          <a:bodyPr rtlCol="0" anchor="t"/>
+          <a:lstStyle/>
+          <a:p>
+            <a:pPr algn="ctr"/>
+            <a:r>
+              <a:rPr lang="en-US" dirty="0"/>
+              <a:t>Custom View</a:t>
+            </a:r>
+          </a:p>
+        </p:txBody>
+      </p:sp>
+      <p:sp>
+        <p:nvSpPr>
+          <p:cNvPr id="15" name="Curved Right Arrow 14">
+            <a:extLst>
+              <a:ext uri="{FF2B5EF4-FFF2-40B4-BE49-F238E27FC236}">
+                <a16:creationId xmlns:a16="http://schemas.microsoft.com/office/drawing/2014/main" id="{253DCF40-E1D9-CC42-9550-555773D84D76}"/>
+              </a:ext>
+            </a:extLst>
+          </p:cNvPr>
+          <p:cNvSpPr/>
+          <p:nvPr/>
+        </p:nvSpPr>
+        <p:spPr>
+          <a:xfrm>
+            <a:off x="5980715" y="4103013"/>
+            <a:ext cx="405491" cy="779230"/>
+          </a:xfrm>
+          <a:prstGeom prst="curvedRightArrow">
+            <a:avLst/>
+          </a:prstGeom>
+          <a:solidFill>
+            <a:srgbClr val="0070C0"/>
+          </a:solidFill>
+        </p:spPr>
+        <p:style>
+          <a:lnRef idx="2">
+            <a:schemeClr val="accent1">
+              <a:shade val="50000"/>
+            </a:schemeClr>
+          </a:lnRef>
+          <a:fillRef idx="1">
+            <a:schemeClr val="accent1"/>
+          </a:fillRef>
+          <a:effectRef idx="0">
+            <a:schemeClr val="accent1"/>
+          </a:effectRef>
+          <a:fontRef idx="minor">
+            <a:schemeClr val="lt1"/>
+          </a:fontRef>
+        </p:style>
+        <p:txBody>
+          <a:bodyPr rtlCol="0" anchor="ctr"/>
+          <a:lstStyle/>
+          <a:p>
+            <a:pPr algn="ctr"/>
+            <a:endParaRPr lang="en-US">
+              <a:solidFill>
+                <a:schemeClr val="tx1"/>
+              </a:solidFill>
+            </a:endParaRPr>
+          </a:p>
+        </p:txBody>
+      </p:sp>
+      <p:sp>
+        <p:nvSpPr>
+          <p:cNvPr id="16" name="TextBox 15">
+            <a:extLst>
+              <a:ext uri="{FF2B5EF4-FFF2-40B4-BE49-F238E27FC236}">
+                <a16:creationId xmlns:a16="http://schemas.microsoft.com/office/drawing/2014/main" id="{F2D5DCAE-9572-B748-AEA0-9CAE26A060C4}"/>
+              </a:ext>
+            </a:extLst>
+          </p:cNvPr>
+          <p:cNvSpPr txBox="1"/>
+          <p:nvPr/>
+        </p:nvSpPr>
+        <p:spPr>
+          <a:xfrm flipH="1">
+            <a:off x="3123215" y="4266664"/>
+            <a:ext cx="3262993" cy="369332"/>
+          </a:xfrm>
+          <a:prstGeom prst="rect">
+            <a:avLst/>
+          </a:prstGeom>
+          <a:noFill/>
+        </p:spPr>
+        <p:txBody>
+          <a:bodyPr wrap="square" rtlCol="0">
+            <a:spAutoFit/>
+          </a:bodyPr>
+          <a:lstStyle/>
+          <a:p>
+            <a:r>
+              <a:rPr lang="en-US" dirty="0" err="1"/>
+              <a:t>customView.BindingContext</a:t>
+            </a:r>
+            <a:endParaRPr lang="en-US" dirty="0"/>
+          </a:p>
+        </p:txBody>
+      </p:sp>
+      <p:sp>
+        <p:nvSpPr>
+          <p:cNvPr id="17" name="Rectangle 16">
+            <a:extLst>
+              <a:ext uri="{FF2B5EF4-FFF2-40B4-BE49-F238E27FC236}">
+                <a16:creationId xmlns:a16="http://schemas.microsoft.com/office/drawing/2014/main" id="{80DFF4DC-E068-8A40-A234-9B1765090257}"/>
+              </a:ext>
+            </a:extLst>
+          </p:cNvPr>
+          <p:cNvSpPr/>
+          <p:nvPr/>
+        </p:nvSpPr>
+        <p:spPr>
+          <a:xfrm>
+            <a:off x="6846130" y="5037364"/>
+            <a:ext cx="865414" cy="612322"/>
+          </a:xfrm>
+          <a:prstGeom prst="rect">
+            <a:avLst/>
+          </a:prstGeom>
+        </p:spPr>
+        <p:style>
+          <a:lnRef idx="2">
+            <a:schemeClr val="accent1">
+              <a:shade val="50000"/>
+            </a:schemeClr>
+          </a:lnRef>
+          <a:fillRef idx="1">
+            <a:schemeClr val="accent1"/>
+          </a:fillRef>
+          <a:effectRef idx="0">
+            <a:schemeClr val="accent1"/>
+          </a:effectRef>
+          <a:fontRef idx="minor">
+            <a:schemeClr val="lt1"/>
+          </a:fontRef>
+        </p:style>
+        <p:txBody>
+          <a:bodyPr rtlCol="0" anchor="ctr"/>
+          <a:lstStyle/>
+          <a:p>
+            <a:pPr algn="ctr"/>
+            <a:r>
+              <a:rPr lang="en-US" dirty="0"/>
+              <a:t>View</a:t>
+            </a:r>
+          </a:p>
+        </p:txBody>
+      </p:sp>
+      <p:sp>
+        <p:nvSpPr>
+          <p:cNvPr id="18" name="Rectangle 17">
+            <a:extLst>
+              <a:ext uri="{FF2B5EF4-FFF2-40B4-BE49-F238E27FC236}">
+                <a16:creationId xmlns:a16="http://schemas.microsoft.com/office/drawing/2014/main" id="{6E400F78-D175-8D4B-8F77-B2B353167BA8}"/>
+              </a:ext>
+            </a:extLst>
+          </p:cNvPr>
+          <p:cNvSpPr/>
+          <p:nvPr/>
+        </p:nvSpPr>
+        <p:spPr>
+          <a:xfrm>
+            <a:off x="8381016" y="5037364"/>
+            <a:ext cx="865414" cy="612322"/>
+          </a:xfrm>
+          <a:prstGeom prst="rect">
+            <a:avLst/>
+          </a:prstGeom>
+        </p:spPr>
+        <p:style>
+          <a:lnRef idx="2">
+            <a:schemeClr val="accent1">
+              <a:shade val="50000"/>
+            </a:schemeClr>
+          </a:lnRef>
+          <a:fillRef idx="1">
+            <a:schemeClr val="accent1"/>
+          </a:fillRef>
+          <a:effectRef idx="0">
+            <a:schemeClr val="accent1"/>
+          </a:effectRef>
+          <a:fontRef idx="minor">
+            <a:schemeClr val="lt1"/>
+          </a:fontRef>
+        </p:style>
+        <p:txBody>
+          <a:bodyPr rtlCol="0" anchor="ctr"/>
+          <a:lstStyle/>
+          <a:p>
+            <a:pPr algn="ctr"/>
+            <a:r>
+              <a:rPr lang="en-US" dirty="0"/>
+              <a:t>View</a:t>
+            </a:r>
+          </a:p>
+        </p:txBody>
+      </p:sp>
+      <p:sp>
+        <p:nvSpPr>
+          <p:cNvPr id="19" name="Rectangle 18">
+            <a:extLst>
+              <a:ext uri="{FF2B5EF4-FFF2-40B4-BE49-F238E27FC236}">
+                <a16:creationId xmlns:a16="http://schemas.microsoft.com/office/drawing/2014/main" id="{1E21505D-F423-6544-9552-86F1BD5FE5C7}"/>
+              </a:ext>
+            </a:extLst>
+          </p:cNvPr>
+          <p:cNvSpPr/>
+          <p:nvPr/>
+        </p:nvSpPr>
+        <p:spPr>
+          <a:xfrm>
+            <a:off x="9915902" y="5037364"/>
+            <a:ext cx="865414" cy="612322"/>
+          </a:xfrm>
+          <a:prstGeom prst="rect">
+            <a:avLst/>
+          </a:prstGeom>
+        </p:spPr>
+        <p:style>
+          <a:lnRef idx="2">
+            <a:schemeClr val="accent1">
+              <a:shade val="50000"/>
+            </a:schemeClr>
+          </a:lnRef>
+          <a:fillRef idx="1">
+            <a:schemeClr val="accent1"/>
+          </a:fillRef>
+          <a:effectRef idx="0">
+            <a:schemeClr val="accent1"/>
+          </a:effectRef>
+          <a:fontRef idx="minor">
+            <a:schemeClr val="lt1"/>
+          </a:fontRef>
+        </p:style>
+        <p:txBody>
+          <a:bodyPr rtlCol="0" anchor="ctr"/>
+          <a:lstStyle/>
+          <a:p>
+            <a:pPr algn="ctr"/>
+            <a:r>
+              <a:rPr lang="en-US" dirty="0"/>
+              <a:t>View</a:t>
+            </a:r>
+          </a:p>
+        </p:txBody>
+      </p:sp>
+      <p:sp>
+        <p:nvSpPr>
+          <p:cNvPr id="20" name="Curved Right Arrow 19">
+            <a:extLst>
+              <a:ext uri="{FF2B5EF4-FFF2-40B4-BE49-F238E27FC236}">
+                <a16:creationId xmlns:a16="http://schemas.microsoft.com/office/drawing/2014/main" id="{71D3310F-1684-5643-84A9-F1D2A1DA9259}"/>
+              </a:ext>
+            </a:extLst>
+          </p:cNvPr>
+          <p:cNvSpPr/>
+          <p:nvPr/>
+        </p:nvSpPr>
+        <p:spPr>
+          <a:xfrm>
+            <a:off x="6255579" y="4707170"/>
+            <a:ext cx="459921" cy="779229"/>
+          </a:xfrm>
+          <a:prstGeom prst="curvedRightArrow">
+            <a:avLst/>
+          </a:prstGeom>
+          <a:solidFill>
+            <a:srgbClr val="0070C0"/>
+          </a:solidFill>
+        </p:spPr>
+        <p:style>
+          <a:lnRef idx="2">
+            <a:schemeClr val="accent1">
+              <a:shade val="50000"/>
+            </a:schemeClr>
+          </a:lnRef>
+          <a:fillRef idx="1">
+            <a:schemeClr val="accent1"/>
+          </a:fillRef>
+          <a:effectRef idx="0">
+            <a:schemeClr val="accent1"/>
+          </a:effectRef>
+          <a:fontRef idx="minor">
+            <a:schemeClr val="lt1"/>
+          </a:fontRef>
+        </p:style>
+        <p:txBody>
+          <a:bodyPr rtlCol="0" anchor="ctr"/>
+          <a:lstStyle/>
+          <a:p>
+            <a:pPr algn="ctr"/>
+            <a:endParaRPr lang="en-US">
+              <a:solidFill>
+                <a:schemeClr val="tx1"/>
+              </a:solidFill>
+            </a:endParaRPr>
+          </a:p>
+        </p:txBody>
+      </p:sp>
+      <p:sp>
+        <p:nvSpPr>
+          <p:cNvPr id="21" name="TextBox 20">
+            <a:extLst>
+              <a:ext uri="{FF2B5EF4-FFF2-40B4-BE49-F238E27FC236}">
+                <a16:creationId xmlns:a16="http://schemas.microsoft.com/office/drawing/2014/main" id="{AE9E7E40-AADD-DB41-8F3E-7463F2B3F142}"/>
+              </a:ext>
+            </a:extLst>
+          </p:cNvPr>
+          <p:cNvSpPr txBox="1"/>
+          <p:nvPr/>
+        </p:nvSpPr>
+        <p:spPr>
+          <a:xfrm flipH="1">
+            <a:off x="2240910" y="4895847"/>
+            <a:ext cx="4452632" cy="369332"/>
+          </a:xfrm>
+          <a:prstGeom prst="rect">
+            <a:avLst/>
+          </a:prstGeom>
+          <a:noFill/>
+        </p:spPr>
+        <p:txBody>
+          <a:bodyPr wrap="square" rtlCol="0">
+            <a:spAutoFit/>
+          </a:bodyPr>
+          <a:lstStyle/>
+          <a:p>
+            <a:r>
+              <a:rPr lang="en-US" dirty="0" err="1"/>
+              <a:t>customView.Container.BindingContext</a:t>
+            </a:r>
+            <a:endParaRPr lang="en-US" dirty="0"/>
+          </a:p>
+        </p:txBody>
+      </p:sp>
+    </p:spTree>
+    <p:extLst>
+      <p:ext uri="{BB962C8B-B14F-4D97-AF65-F5344CB8AC3E}">
+        <p14:creationId xmlns:p14="http://schemas.microsoft.com/office/powerpoint/2010/main" val="2146938672"/>
+      </p:ext>
+    </p:extLst>
+  </p:cSld>
+  <p:clrMapOvr>
+    <a:masterClrMapping/>
+  </p:clrMapOvr>
+</p:sld>
+</file>
+
+<file path=ppt/slides/slide19.xml><?xml version="1.0" encoding="utf-8"?>
+<p:sld xmlns:a="http://schemas.openxmlformats.org/drawingml/2006/main" xmlns:r="http://schemas.openxmlformats.org/officeDocument/2006/relationships" xmlns:p="http://schemas.openxmlformats.org/presentationml/2006/main">
+  <p:cSld>
+    <p:spTree>
+      <p:nvGrpSpPr>
+        <p:cNvPr id="1" name=""/>
+        <p:cNvGrpSpPr/>
+        <p:nvPr/>
+      </p:nvGrpSpPr>
+      <p:grpSpPr>
+        <a:xfrm>
+          <a:off x="0" y="0"/>
+          <a:ext cx="0" cy="0"/>
+          <a:chOff x="0" y="0"/>
+          <a:chExt cx="0" cy="0"/>
+        </a:xfrm>
+      </p:grpSpPr>
+      <p:sp>
+        <p:nvSpPr>
+          <p:cNvPr id="3" name="Title 2">
+            <a:extLst>
+              <a:ext uri="{FF2B5EF4-FFF2-40B4-BE49-F238E27FC236}">
+                <a16:creationId xmlns:a16="http://schemas.microsoft.com/office/drawing/2014/main" id="{2B9FFB42-A399-9949-9580-1376988864BD}"/>
               </a:ext>
             </a:extLst>
           </p:cNvPr>
@@ -6283,7 +7170,7 @@
             <a:spLocks noGrp="1"/>
           </p:cNvSpPr>
           <p:nvPr>
-            <p:ph idx="1"/>
+            <p:ph type="title"/>
           </p:nvPr>
         </p:nvSpPr>
         <p:spPr/>
@@ -6292,17 +7179,373 @@
           <a:lstStyle/>
           <a:p>
             <a:r>
-              <a:rPr lang="en-US" dirty="0"/>
-              <a:t>Q &amp; A</a:t>
-            </a:r>
-          </a:p>
-          <a:p>
+              <a:rPr lang="en-US" dirty="0" err="1"/>
+              <a:t>BindableProperty</a:t>
+            </a:r>
             <a:endParaRPr lang="en-US" dirty="0"/>
           </a:p>
-          <a:p>
-            <a:r>
-              <a:rPr lang="en-US" dirty="0"/>
-              <a:t>Next week – Binding</a:t>
+        </p:txBody>
+      </p:sp>
+      <p:sp>
+        <p:nvSpPr>
+          <p:cNvPr id="4" name="Rectangle 3">
+            <a:extLst>
+              <a:ext uri="{FF2B5EF4-FFF2-40B4-BE49-F238E27FC236}">
+                <a16:creationId xmlns:a16="http://schemas.microsoft.com/office/drawing/2014/main" id="{73DE5F04-E230-0347-93EB-B8F59ED85A5D}"/>
+              </a:ext>
+            </a:extLst>
+          </p:cNvPr>
+          <p:cNvSpPr/>
+          <p:nvPr/>
+        </p:nvSpPr>
+        <p:spPr>
+          <a:xfrm>
+            <a:off x="386499" y="1113445"/>
+            <a:ext cx="10989100" cy="685800"/>
+          </a:xfrm>
+          <a:prstGeom prst="rect">
+            <a:avLst/>
+          </a:prstGeom>
+        </p:spPr>
+        <p:style>
+          <a:lnRef idx="2">
+            <a:schemeClr val="accent1">
+              <a:shade val="50000"/>
+            </a:schemeClr>
+          </a:lnRef>
+          <a:fillRef idx="1">
+            <a:schemeClr val="accent1"/>
+          </a:fillRef>
+          <a:effectRef idx="0">
+            <a:schemeClr val="accent1"/>
+          </a:effectRef>
+          <a:fontRef idx="minor">
+            <a:schemeClr val="lt1"/>
+          </a:fontRef>
+        </p:style>
+        <p:txBody>
+          <a:bodyPr rtlCol="0" anchor="ctr"/>
+          <a:lstStyle/>
+          <a:p>
+            <a:r>
+              <a:rPr lang="en-US" dirty="0"/>
+              <a:t>Normally used in class that inherits from </a:t>
+            </a:r>
+            <a:r>
+              <a:rPr lang="en-US" dirty="0" err="1"/>
+              <a:t>BindableObject</a:t>
+            </a:r>
+            <a:r>
+              <a:rPr lang="en-US" dirty="0"/>
+              <a:t> </a:t>
+            </a:r>
+          </a:p>
+        </p:txBody>
+      </p:sp>
+      <p:sp>
+        <p:nvSpPr>
+          <p:cNvPr id="5" name="Rectangle 4">
+            <a:extLst>
+              <a:ext uri="{FF2B5EF4-FFF2-40B4-BE49-F238E27FC236}">
+                <a16:creationId xmlns:a16="http://schemas.microsoft.com/office/drawing/2014/main" id="{E63534E4-C6BE-4E40-902C-7272108CF0C7}"/>
+              </a:ext>
+            </a:extLst>
+          </p:cNvPr>
+          <p:cNvSpPr/>
+          <p:nvPr/>
+        </p:nvSpPr>
+        <p:spPr>
+          <a:xfrm>
+            <a:off x="386499" y="1961684"/>
+            <a:ext cx="10989100" cy="685800"/>
+          </a:xfrm>
+          <a:prstGeom prst="rect">
+            <a:avLst/>
+          </a:prstGeom>
+        </p:spPr>
+        <p:style>
+          <a:lnRef idx="2">
+            <a:schemeClr val="accent1">
+              <a:shade val="50000"/>
+            </a:schemeClr>
+          </a:lnRef>
+          <a:fillRef idx="1">
+            <a:schemeClr val="accent1"/>
+          </a:fillRef>
+          <a:effectRef idx="0">
+            <a:schemeClr val="accent1"/>
+          </a:effectRef>
+          <a:fontRef idx="minor">
+            <a:schemeClr val="lt1"/>
+          </a:fontRef>
+        </p:style>
+        <p:txBody>
+          <a:bodyPr rtlCol="0" anchor="ctr"/>
+          <a:lstStyle/>
+          <a:p>
+            <a:r>
+              <a:rPr lang="en-US" dirty="0"/>
+              <a:t>Name format is important for binding</a:t>
+            </a:r>
+          </a:p>
+        </p:txBody>
+      </p:sp>
+      <p:sp>
+        <p:nvSpPr>
+          <p:cNvPr id="6" name="Rectangle 5">
+            <a:extLst>
+              <a:ext uri="{FF2B5EF4-FFF2-40B4-BE49-F238E27FC236}">
+                <a16:creationId xmlns:a16="http://schemas.microsoft.com/office/drawing/2014/main" id="{F7E45133-C977-3741-986A-E72768CBD07C}"/>
+              </a:ext>
+            </a:extLst>
+          </p:cNvPr>
+          <p:cNvSpPr/>
+          <p:nvPr/>
+        </p:nvSpPr>
+        <p:spPr>
+          <a:xfrm>
+            <a:off x="386499" y="2809923"/>
+            <a:ext cx="10989100" cy="685800"/>
+          </a:xfrm>
+          <a:prstGeom prst="rect">
+            <a:avLst/>
+          </a:prstGeom>
+        </p:spPr>
+        <p:style>
+          <a:lnRef idx="2">
+            <a:schemeClr val="accent1">
+              <a:shade val="50000"/>
+            </a:schemeClr>
+          </a:lnRef>
+          <a:fillRef idx="1">
+            <a:schemeClr val="accent1"/>
+          </a:fillRef>
+          <a:effectRef idx="0">
+            <a:schemeClr val="accent1"/>
+          </a:effectRef>
+          <a:fontRef idx="minor">
+            <a:schemeClr val="lt1"/>
+          </a:fontRef>
+        </p:style>
+        <p:txBody>
+          <a:bodyPr rtlCol="0" anchor="ctr"/>
+          <a:lstStyle/>
+          <a:p>
+            <a:r>
+              <a:rPr lang="en-US" dirty="0"/>
+              <a:t>Should not normally be used in binding sources who are not also a binding target</a:t>
+            </a:r>
+          </a:p>
+        </p:txBody>
+      </p:sp>
+      <p:sp>
+        <p:nvSpPr>
+          <p:cNvPr id="7" name="Rectangle 6">
+            <a:extLst>
+              <a:ext uri="{FF2B5EF4-FFF2-40B4-BE49-F238E27FC236}">
+                <a16:creationId xmlns:a16="http://schemas.microsoft.com/office/drawing/2014/main" id="{B9AEFE97-5EB0-814F-A07B-8EEAFC28F9E7}"/>
+              </a:ext>
+            </a:extLst>
+          </p:cNvPr>
+          <p:cNvSpPr/>
+          <p:nvPr/>
+        </p:nvSpPr>
+        <p:spPr>
+          <a:xfrm>
+            <a:off x="386499" y="3658162"/>
+            <a:ext cx="10989100" cy="685800"/>
+          </a:xfrm>
+          <a:prstGeom prst="rect">
+            <a:avLst/>
+          </a:prstGeom>
+        </p:spPr>
+        <p:style>
+          <a:lnRef idx="2">
+            <a:schemeClr val="accent1">
+              <a:shade val="50000"/>
+            </a:schemeClr>
+          </a:lnRef>
+          <a:fillRef idx="1">
+            <a:schemeClr val="accent1"/>
+          </a:fillRef>
+          <a:effectRef idx="0">
+            <a:schemeClr val="accent1"/>
+          </a:effectRef>
+          <a:fontRef idx="minor">
+            <a:schemeClr val="lt1"/>
+          </a:fontRef>
+        </p:style>
+        <p:txBody>
+          <a:bodyPr rtlCol="0" anchor="ctr"/>
+          <a:lstStyle/>
+          <a:p>
+            <a:r>
+              <a:rPr lang="en-US" dirty="0"/>
+              <a:t>Properties using </a:t>
+            </a:r>
+            <a:r>
+              <a:rPr lang="en-US" dirty="0" err="1"/>
+              <a:t>BindableProperty</a:t>
+            </a:r>
+            <a:r>
+              <a:rPr lang="en-US" dirty="0"/>
+              <a:t> can be a source OR target of a binding</a:t>
+            </a:r>
+          </a:p>
+        </p:txBody>
+      </p:sp>
+      <p:sp>
+        <p:nvSpPr>
+          <p:cNvPr id="8" name="TextBox 7">
+            <a:extLst>
+              <a:ext uri="{FF2B5EF4-FFF2-40B4-BE49-F238E27FC236}">
+                <a16:creationId xmlns:a16="http://schemas.microsoft.com/office/drawing/2014/main" id="{BAB4DF0A-1BB7-9C40-B046-7B569CF760E6}"/>
+              </a:ext>
+            </a:extLst>
+          </p:cNvPr>
+          <p:cNvSpPr txBox="1"/>
+          <p:nvPr/>
+        </p:nvSpPr>
+        <p:spPr>
+          <a:xfrm>
+            <a:off x="540327" y="4426526"/>
+            <a:ext cx="10989100" cy="1815882"/>
+          </a:xfrm>
+          <a:prstGeom prst="rect">
+            <a:avLst/>
+          </a:prstGeom>
+          <a:noFill/>
+        </p:spPr>
+        <p:txBody>
+          <a:bodyPr wrap="square" rtlCol="0">
+            <a:spAutoFit/>
+          </a:bodyPr>
+          <a:lstStyle/>
+          <a:p>
+            <a:r>
+              <a:rPr lang="en-US" sz="1400" dirty="0"/>
+              <a:t>public static </a:t>
+            </a:r>
+            <a:r>
+              <a:rPr lang="en-US" sz="1400" dirty="0" err="1"/>
+              <a:t>BindableProperty</a:t>
+            </a:r>
+            <a:r>
+              <a:rPr lang="en-US" sz="1400" dirty="0"/>
+              <a:t> Address1Property = </a:t>
+            </a:r>
+            <a:r>
+              <a:rPr lang="en-US" sz="1400" dirty="0" err="1"/>
+              <a:t>BindableProperty.Create</a:t>
+            </a:r>
+            <a:r>
+              <a:rPr lang="en-US" sz="1400" dirty="0"/>
+              <a:t>(</a:t>
+            </a:r>
+            <a:r>
+              <a:rPr lang="en-US" sz="1400" dirty="0" err="1"/>
+              <a:t>nameof</a:t>
+            </a:r>
+            <a:r>
+              <a:rPr lang="en-US" sz="1400" dirty="0"/>
+              <a:t>(Address1), </a:t>
+            </a:r>
+            <a:r>
+              <a:rPr lang="en-US" sz="1400" dirty="0" err="1"/>
+              <a:t>typeof</a:t>
+            </a:r>
+            <a:r>
+              <a:rPr lang="en-US" sz="1400" dirty="0"/>
+              <a:t>(string), </a:t>
+            </a:r>
+            <a:r>
+              <a:rPr lang="en-US" sz="1400" dirty="0" err="1"/>
+              <a:t>typeof</a:t>
+            </a:r>
+            <a:r>
+              <a:rPr lang="en-US" sz="1400" dirty="0"/>
+              <a:t>(</a:t>
+            </a:r>
+            <a:r>
+              <a:rPr lang="en-US" sz="1400" dirty="0" err="1"/>
+              <a:t>AddressView</a:t>
+            </a:r>
+            <a:r>
+              <a:rPr lang="en-US" sz="1400" dirty="0"/>
+              <a:t>), </a:t>
+            </a:r>
+            <a:r>
+              <a:rPr lang="en-US" sz="1400" dirty="0" err="1"/>
+              <a:t>defaultValue</a:t>
+            </a:r>
+            <a:r>
+              <a:rPr lang="en-US" sz="1400" dirty="0"/>
+              <a:t>: "", </a:t>
+            </a:r>
+            <a:r>
+              <a:rPr lang="en-US" sz="1400" dirty="0" err="1"/>
+              <a:t>defaultBindingMode</a:t>
+            </a:r>
+            <a:r>
+              <a:rPr lang="en-US" sz="1400" dirty="0"/>
+              <a:t>: </a:t>
+            </a:r>
+            <a:r>
+              <a:rPr lang="en-US" sz="1400" dirty="0" err="1"/>
+              <a:t>BindingMode.TwoWay</a:t>
+            </a:r>
+            <a:r>
+              <a:rPr lang="en-US" sz="1400" dirty="0"/>
+              <a:t>);</a:t>
+            </a:r>
+          </a:p>
+          <a:p>
+            <a:endParaRPr lang="en-US" sz="1400" dirty="0"/>
+          </a:p>
+          <a:p>
+            <a:r>
+              <a:rPr lang="en-US" sz="1400" dirty="0"/>
+              <a:t>public string Address1</a:t>
+            </a:r>
+          </a:p>
+          <a:p>
+            <a:r>
+              <a:rPr lang="en-US" sz="1400" dirty="0"/>
+              <a:t>{</a:t>
+            </a:r>
+          </a:p>
+          <a:p>
+            <a:r>
+              <a:rPr lang="en-US" sz="1400" dirty="0"/>
+              <a:t>    get =&gt; (string)</a:t>
+            </a:r>
+            <a:r>
+              <a:rPr lang="en-US" sz="1400" dirty="0" err="1"/>
+              <a:t>GetValue</a:t>
+            </a:r>
+            <a:r>
+              <a:rPr lang="en-US" sz="1400" dirty="0"/>
+              <a:t>(Address1Property);</a:t>
+            </a:r>
+          </a:p>
+          <a:p>
+            <a:r>
+              <a:rPr lang="en-US" sz="1400" dirty="0"/>
+              <a:t>    set =&gt; </a:t>
+            </a:r>
+            <a:r>
+              <a:rPr lang="en-US" sz="1400" dirty="0" err="1"/>
+              <a:t>SetValue</a:t>
+            </a:r>
+            <a:r>
+              <a:rPr lang="en-US" sz="1400" dirty="0"/>
+              <a:t>(Address1Property, value);</a:t>
+            </a:r>
+          </a:p>
+          <a:p>
+            <a:r>
+              <a:rPr lang="en-US" sz="1400" dirty="0"/>
+              <a:t>}</a:t>
             </a:r>
           </a:p>
         </p:txBody>
@@ -6310,7 +7553,7 @@
     </p:spTree>
     <p:extLst>
       <p:ext uri="{BB962C8B-B14F-4D97-AF65-F5344CB8AC3E}">
-        <p14:creationId xmlns:p14="http://schemas.microsoft.com/office/powerpoint/2010/main" val="1493233687"/>
+        <p14:creationId xmlns:p14="http://schemas.microsoft.com/office/powerpoint/2010/main" val="1991586827"/>
       </p:ext>
     </p:extLst>
   </p:cSld>
@@ -6384,6 +7627,1283 @@
 </p:sld>
 </file>
 
+<file path=ppt/slides/slide20.xml><?xml version="1.0" encoding="utf-8"?>
+<p:sld xmlns:a="http://schemas.openxmlformats.org/drawingml/2006/main" xmlns:r="http://schemas.openxmlformats.org/officeDocument/2006/relationships" xmlns:p="http://schemas.openxmlformats.org/presentationml/2006/main">
+  <p:cSld>
+    <p:spTree>
+      <p:nvGrpSpPr>
+        <p:cNvPr id="1" name=""/>
+        <p:cNvGrpSpPr/>
+        <p:nvPr/>
+      </p:nvGrpSpPr>
+      <p:grpSpPr>
+        <a:xfrm>
+          <a:off x="0" y="0"/>
+          <a:ext cx="0" cy="0"/>
+          <a:chOff x="0" y="0"/>
+          <a:chExt cx="0" cy="0"/>
+        </a:xfrm>
+      </p:grpSpPr>
+      <p:sp>
+        <p:nvSpPr>
+          <p:cNvPr id="2" name="Content Placeholder 1">
+            <a:extLst>
+              <a:ext uri="{FF2B5EF4-FFF2-40B4-BE49-F238E27FC236}">
+                <a16:creationId xmlns:a16="http://schemas.microsoft.com/office/drawing/2014/main" id="{3B3EA67C-6F4B-074D-977A-0F42659CC37A}"/>
+              </a:ext>
+            </a:extLst>
+          </p:cNvPr>
+          <p:cNvSpPr>
+            <a:spLocks noGrp="1"/>
+          </p:cNvSpPr>
+          <p:nvPr>
+            <p:ph idx="1"/>
+          </p:nvPr>
+        </p:nvSpPr>
+        <p:spPr/>
+        <p:txBody>
+          <a:bodyPr anchor="ctr"/>
+          <a:lstStyle/>
+          <a:p>
+            <a:pPr marL="0" indent="0" algn="ctr">
+              <a:buNone/>
+            </a:pPr>
+            <a:r>
+              <a:rPr lang="en-US" dirty="0"/>
+              <a:t>Demo 5: Custom Bindable Views</a:t>
+            </a:r>
+          </a:p>
+        </p:txBody>
+      </p:sp>
+    </p:spTree>
+    <p:extLst>
+      <p:ext uri="{BB962C8B-B14F-4D97-AF65-F5344CB8AC3E}">
+        <p14:creationId xmlns:p14="http://schemas.microsoft.com/office/powerpoint/2010/main" val="3423243541"/>
+      </p:ext>
+    </p:extLst>
+  </p:cSld>
+  <p:clrMapOvr>
+    <a:masterClrMapping/>
+  </p:clrMapOvr>
+</p:sld>
+</file>
+
+<file path=ppt/slides/slide21.xml><?xml version="1.0" encoding="utf-8"?>
+<p:sld xmlns:a="http://schemas.openxmlformats.org/drawingml/2006/main" xmlns:r="http://schemas.openxmlformats.org/officeDocument/2006/relationships" xmlns:p="http://schemas.openxmlformats.org/presentationml/2006/main">
+  <p:cSld>
+    <p:spTree>
+      <p:nvGrpSpPr>
+        <p:cNvPr id="1" name=""/>
+        <p:cNvGrpSpPr/>
+        <p:nvPr/>
+      </p:nvGrpSpPr>
+      <p:grpSpPr>
+        <a:xfrm>
+          <a:off x="0" y="0"/>
+          <a:ext cx="0" cy="0"/>
+          <a:chOff x="0" y="0"/>
+          <a:chExt cx="0" cy="0"/>
+        </a:xfrm>
+      </p:grpSpPr>
+      <p:sp>
+        <p:nvSpPr>
+          <p:cNvPr id="3" name="Title 2">
+            <a:extLst>
+              <a:ext uri="{FF2B5EF4-FFF2-40B4-BE49-F238E27FC236}">
+                <a16:creationId xmlns:a16="http://schemas.microsoft.com/office/drawing/2014/main" id="{2BAD5E3B-8F45-8B48-BB0E-9A40A846C0B8}"/>
+              </a:ext>
+            </a:extLst>
+          </p:cNvPr>
+          <p:cNvSpPr>
+            <a:spLocks noGrp="1"/>
+          </p:cNvSpPr>
+          <p:nvPr>
+            <p:ph type="title"/>
+          </p:nvPr>
+        </p:nvSpPr>
+        <p:spPr/>
+        <p:txBody>
+          <a:bodyPr/>
+          <a:lstStyle/>
+          <a:p>
+            <a:r>
+              <a:rPr lang="en-US" dirty="0"/>
+              <a:t>Other Binding Properties</a:t>
+            </a:r>
+          </a:p>
+        </p:txBody>
+      </p:sp>
+      <p:sp>
+        <p:nvSpPr>
+          <p:cNvPr id="4" name="Rectangle 3">
+            <a:extLst>
+              <a:ext uri="{FF2B5EF4-FFF2-40B4-BE49-F238E27FC236}">
+                <a16:creationId xmlns:a16="http://schemas.microsoft.com/office/drawing/2014/main" id="{C996408B-7ABA-474B-A24D-81B0834C51F6}"/>
+              </a:ext>
+            </a:extLst>
+          </p:cNvPr>
+          <p:cNvSpPr/>
+          <p:nvPr/>
+        </p:nvSpPr>
+        <p:spPr>
+          <a:xfrm>
+            <a:off x="386499" y="1113445"/>
+            <a:ext cx="10989100" cy="685800"/>
+          </a:xfrm>
+          <a:prstGeom prst="rect">
+            <a:avLst/>
+          </a:prstGeom>
+        </p:spPr>
+        <p:style>
+          <a:lnRef idx="2">
+            <a:schemeClr val="accent1">
+              <a:shade val="50000"/>
+            </a:schemeClr>
+          </a:lnRef>
+          <a:fillRef idx="1">
+            <a:schemeClr val="accent1"/>
+          </a:fillRef>
+          <a:effectRef idx="0">
+            <a:schemeClr val="accent1"/>
+          </a:effectRef>
+          <a:fontRef idx="minor">
+            <a:schemeClr val="lt1"/>
+          </a:fontRef>
+        </p:style>
+        <p:txBody>
+          <a:bodyPr rtlCol="0" anchor="ctr"/>
+          <a:lstStyle/>
+          <a:p>
+            <a:r>
+              <a:rPr lang="en-US" dirty="0"/>
+              <a:t>Path – references sub objects on a binding</a:t>
+            </a:r>
+          </a:p>
+        </p:txBody>
+      </p:sp>
+      <p:sp>
+        <p:nvSpPr>
+          <p:cNvPr id="5" name="TextBox 4">
+            <a:extLst>
+              <a:ext uri="{FF2B5EF4-FFF2-40B4-BE49-F238E27FC236}">
+                <a16:creationId xmlns:a16="http://schemas.microsoft.com/office/drawing/2014/main" id="{027A3EFF-ABB6-BC42-A73A-1BE740B19371}"/>
+              </a:ext>
+            </a:extLst>
+          </p:cNvPr>
+          <p:cNvSpPr txBox="1"/>
+          <p:nvPr/>
+        </p:nvSpPr>
+        <p:spPr>
+          <a:xfrm>
+            <a:off x="571500" y="1931810"/>
+            <a:ext cx="8043863" cy="371475"/>
+          </a:xfrm>
+          <a:prstGeom prst="rect">
+            <a:avLst/>
+          </a:prstGeom>
+          <a:noFill/>
+        </p:spPr>
+        <p:txBody>
+          <a:bodyPr wrap="square" rtlCol="0">
+            <a:spAutoFit/>
+          </a:bodyPr>
+          <a:lstStyle/>
+          <a:p>
+            <a:r>
+              <a:rPr lang="en-US" dirty="0"/>
+              <a:t>{Binding Source={</a:t>
+            </a:r>
+            <a:r>
+              <a:rPr lang="en-US" dirty="0" err="1"/>
+              <a:t>x:Reference</a:t>
+            </a:r>
+            <a:r>
+              <a:rPr lang="en-US" dirty="0"/>
+              <a:t> </a:t>
+            </a:r>
+            <a:r>
+              <a:rPr lang="en-US" dirty="0" err="1"/>
+              <a:t>timePicker</a:t>
+            </a:r>
+            <a:r>
+              <a:rPr lang="en-US" dirty="0"/>
+              <a:t>}, Path=</a:t>
+            </a:r>
+            <a:r>
+              <a:rPr lang="en-US" dirty="0" err="1"/>
+              <a:t>Time.TotalSeconds</a:t>
+            </a:r>
+            <a:r>
+              <a:rPr lang="en-US" dirty="0"/>
+              <a:t>}</a:t>
+            </a:r>
+          </a:p>
+        </p:txBody>
+      </p:sp>
+      <p:sp>
+        <p:nvSpPr>
+          <p:cNvPr id="6" name="Rectangle 5">
+            <a:extLst>
+              <a:ext uri="{FF2B5EF4-FFF2-40B4-BE49-F238E27FC236}">
+                <a16:creationId xmlns:a16="http://schemas.microsoft.com/office/drawing/2014/main" id="{C115FEDD-6B29-9147-9177-DC6D7095C97B}"/>
+              </a:ext>
+            </a:extLst>
+          </p:cNvPr>
+          <p:cNvSpPr/>
+          <p:nvPr/>
+        </p:nvSpPr>
+        <p:spPr>
+          <a:xfrm>
+            <a:off x="386499" y="2435850"/>
+            <a:ext cx="10989100" cy="685800"/>
+          </a:xfrm>
+          <a:prstGeom prst="rect">
+            <a:avLst/>
+          </a:prstGeom>
+        </p:spPr>
+        <p:style>
+          <a:lnRef idx="2">
+            <a:schemeClr val="accent1">
+              <a:shade val="50000"/>
+            </a:schemeClr>
+          </a:lnRef>
+          <a:fillRef idx="1">
+            <a:schemeClr val="accent1"/>
+          </a:fillRef>
+          <a:effectRef idx="0">
+            <a:schemeClr val="accent1"/>
+          </a:effectRef>
+          <a:fontRef idx="minor">
+            <a:schemeClr val="lt1"/>
+          </a:fontRef>
+        </p:style>
+        <p:txBody>
+          <a:bodyPr rtlCol="0" anchor="ctr"/>
+          <a:lstStyle/>
+          <a:p>
+            <a:r>
+              <a:rPr lang="en-US" dirty="0" err="1"/>
+              <a:t>FallbackValue</a:t>
+            </a:r>
+            <a:r>
+              <a:rPr lang="en-US" dirty="0"/>
+              <a:t> – Something to use if a binding cannot be found</a:t>
+            </a:r>
+          </a:p>
+        </p:txBody>
+      </p:sp>
+      <p:sp>
+        <p:nvSpPr>
+          <p:cNvPr id="7" name="Rectangle 6">
+            <a:extLst>
+              <a:ext uri="{FF2B5EF4-FFF2-40B4-BE49-F238E27FC236}">
+                <a16:creationId xmlns:a16="http://schemas.microsoft.com/office/drawing/2014/main" id="{3D9DF530-3ED0-4E4C-954E-6AC8A2B18A8C}"/>
+              </a:ext>
+            </a:extLst>
+          </p:cNvPr>
+          <p:cNvSpPr/>
+          <p:nvPr/>
+        </p:nvSpPr>
+        <p:spPr>
+          <a:xfrm>
+            <a:off x="571500" y="3239927"/>
+            <a:ext cx="8943975" cy="369332"/>
+          </a:xfrm>
+          <a:prstGeom prst="rect">
+            <a:avLst/>
+          </a:prstGeom>
+        </p:spPr>
+        <p:txBody>
+          <a:bodyPr wrap="square">
+            <a:spAutoFit/>
+          </a:bodyPr>
+          <a:lstStyle/>
+          <a:p>
+            <a:r>
+              <a:rPr lang="en-US" dirty="0"/>
+              <a:t>&lt;Label Text="{Binding Population, </a:t>
+            </a:r>
+            <a:r>
+              <a:rPr lang="en-US" dirty="0" err="1"/>
+              <a:t>FallbackValue</a:t>
+            </a:r>
+            <a:r>
+              <a:rPr lang="en-US" dirty="0"/>
+              <a:t>='Population size unknown'}" /&gt; </a:t>
+            </a:r>
+          </a:p>
+        </p:txBody>
+      </p:sp>
+      <p:sp>
+        <p:nvSpPr>
+          <p:cNvPr id="8" name="Rectangle 7">
+            <a:extLst>
+              <a:ext uri="{FF2B5EF4-FFF2-40B4-BE49-F238E27FC236}">
+                <a16:creationId xmlns:a16="http://schemas.microsoft.com/office/drawing/2014/main" id="{73F1D8B4-0AD7-EA4D-91D6-76EDB91E6E4E}"/>
+              </a:ext>
+            </a:extLst>
+          </p:cNvPr>
+          <p:cNvSpPr/>
+          <p:nvPr/>
+        </p:nvSpPr>
+        <p:spPr>
+          <a:xfrm>
+            <a:off x="386499" y="3758255"/>
+            <a:ext cx="10989100" cy="685800"/>
+          </a:xfrm>
+          <a:prstGeom prst="rect">
+            <a:avLst/>
+          </a:prstGeom>
+        </p:spPr>
+        <p:style>
+          <a:lnRef idx="2">
+            <a:schemeClr val="accent1">
+              <a:shade val="50000"/>
+            </a:schemeClr>
+          </a:lnRef>
+          <a:fillRef idx="1">
+            <a:schemeClr val="accent1"/>
+          </a:fillRef>
+          <a:effectRef idx="0">
+            <a:schemeClr val="accent1"/>
+          </a:effectRef>
+          <a:fontRef idx="minor">
+            <a:schemeClr val="lt1"/>
+          </a:fontRef>
+        </p:style>
+        <p:txBody>
+          <a:bodyPr rtlCol="0" anchor="ctr"/>
+          <a:lstStyle/>
+          <a:p>
+            <a:r>
+              <a:rPr lang="en-US" dirty="0" err="1"/>
+              <a:t>TargetNullValue</a:t>
+            </a:r>
+            <a:r>
+              <a:rPr lang="en-US" dirty="0"/>
+              <a:t> – Something to use if a binding can be found but returns a null value</a:t>
+            </a:r>
+          </a:p>
+        </p:txBody>
+      </p:sp>
+      <p:sp>
+        <p:nvSpPr>
+          <p:cNvPr id="9" name="Rectangle 8">
+            <a:extLst>
+              <a:ext uri="{FF2B5EF4-FFF2-40B4-BE49-F238E27FC236}">
+                <a16:creationId xmlns:a16="http://schemas.microsoft.com/office/drawing/2014/main" id="{0846EFB0-D2E4-824A-BABE-ED316518DDBC}"/>
+              </a:ext>
+            </a:extLst>
+          </p:cNvPr>
+          <p:cNvSpPr/>
+          <p:nvPr/>
+        </p:nvSpPr>
+        <p:spPr>
+          <a:xfrm>
+            <a:off x="597055" y="4593051"/>
+            <a:ext cx="10567988" cy="369332"/>
+          </a:xfrm>
+          <a:prstGeom prst="rect">
+            <a:avLst/>
+          </a:prstGeom>
+        </p:spPr>
+        <p:txBody>
+          <a:bodyPr wrap="square">
+            <a:spAutoFit/>
+          </a:bodyPr>
+          <a:lstStyle/>
+          <a:p>
+            <a:r>
+              <a:rPr lang="en-US" dirty="0"/>
+              <a:t>&lt;Label Text="{Binding Location, </a:t>
+            </a:r>
+            <a:r>
+              <a:rPr lang="en-US" dirty="0" err="1"/>
+              <a:t>TargetNullValue</a:t>
+            </a:r>
+            <a:r>
+              <a:rPr lang="en-US" dirty="0"/>
+              <a:t>='Location unknown'}" /&gt;</a:t>
+            </a:r>
+          </a:p>
+        </p:txBody>
+      </p:sp>
+    </p:spTree>
+    <p:extLst>
+      <p:ext uri="{BB962C8B-B14F-4D97-AF65-F5344CB8AC3E}">
+        <p14:creationId xmlns:p14="http://schemas.microsoft.com/office/powerpoint/2010/main" val="1566605566"/>
+      </p:ext>
+    </p:extLst>
+  </p:cSld>
+  <p:clrMapOvr>
+    <a:masterClrMapping/>
+  </p:clrMapOvr>
+</p:sld>
+</file>
+
+<file path=ppt/slides/slide22.xml><?xml version="1.0" encoding="utf-8"?>
+<p:sld xmlns:a="http://schemas.openxmlformats.org/drawingml/2006/main" xmlns:r="http://schemas.openxmlformats.org/officeDocument/2006/relationships" xmlns:p="http://schemas.openxmlformats.org/presentationml/2006/main">
+  <p:cSld>
+    <p:spTree>
+      <p:nvGrpSpPr>
+        <p:cNvPr id="1" name=""/>
+        <p:cNvGrpSpPr/>
+        <p:nvPr/>
+      </p:nvGrpSpPr>
+      <p:grpSpPr>
+        <a:xfrm>
+          <a:off x="0" y="0"/>
+          <a:ext cx="0" cy="0"/>
+          <a:chOff x="0" y="0"/>
+          <a:chExt cx="0" cy="0"/>
+        </a:xfrm>
+      </p:grpSpPr>
+      <p:sp>
+        <p:nvSpPr>
+          <p:cNvPr id="3" name="Title 2">
+            <a:extLst>
+              <a:ext uri="{FF2B5EF4-FFF2-40B4-BE49-F238E27FC236}">
+                <a16:creationId xmlns:a16="http://schemas.microsoft.com/office/drawing/2014/main" id="{38B7B365-4EF2-D24A-B905-5F4E44682A90}"/>
+              </a:ext>
+            </a:extLst>
+          </p:cNvPr>
+          <p:cNvSpPr>
+            <a:spLocks noGrp="1"/>
+          </p:cNvSpPr>
+          <p:nvPr>
+            <p:ph type="title"/>
+          </p:nvPr>
+        </p:nvSpPr>
+        <p:spPr/>
+        <p:txBody>
+          <a:bodyPr/>
+          <a:lstStyle/>
+          <a:p>
+            <a:r>
+              <a:rPr lang="en-US" dirty="0"/>
+              <a:t>Multi-Bindings</a:t>
+            </a:r>
+          </a:p>
+        </p:txBody>
+      </p:sp>
+      <p:sp>
+        <p:nvSpPr>
+          <p:cNvPr id="4" name="Rectangle 3">
+            <a:extLst>
+              <a:ext uri="{FF2B5EF4-FFF2-40B4-BE49-F238E27FC236}">
+                <a16:creationId xmlns:a16="http://schemas.microsoft.com/office/drawing/2014/main" id="{46036BB8-886D-A74D-97EC-24773955158D}"/>
+              </a:ext>
+            </a:extLst>
+          </p:cNvPr>
+          <p:cNvSpPr/>
+          <p:nvPr/>
+        </p:nvSpPr>
+        <p:spPr>
+          <a:xfrm>
+            <a:off x="386499" y="1113445"/>
+            <a:ext cx="10989100" cy="685800"/>
+          </a:xfrm>
+          <a:prstGeom prst="rect">
+            <a:avLst/>
+          </a:prstGeom>
+        </p:spPr>
+        <p:style>
+          <a:lnRef idx="2">
+            <a:schemeClr val="accent1">
+              <a:shade val="50000"/>
+            </a:schemeClr>
+          </a:lnRef>
+          <a:fillRef idx="1">
+            <a:schemeClr val="accent1"/>
+          </a:fillRef>
+          <a:effectRef idx="0">
+            <a:schemeClr val="accent1"/>
+          </a:effectRef>
+          <a:fontRef idx="minor">
+            <a:schemeClr val="lt1"/>
+          </a:fontRef>
+        </p:style>
+        <p:txBody>
+          <a:bodyPr rtlCol="0" anchor="ctr"/>
+          <a:lstStyle/>
+          <a:p>
+            <a:r>
+              <a:rPr lang="en-US" dirty="0"/>
+              <a:t>Allow multiple properties on a source to determine a property on the target </a:t>
+            </a:r>
+          </a:p>
+        </p:txBody>
+      </p:sp>
+      <p:sp>
+        <p:nvSpPr>
+          <p:cNvPr id="5" name="Rectangle 4">
+            <a:extLst>
+              <a:ext uri="{FF2B5EF4-FFF2-40B4-BE49-F238E27FC236}">
+                <a16:creationId xmlns:a16="http://schemas.microsoft.com/office/drawing/2014/main" id="{32E17581-EF10-B645-ADAA-B06762D1D09D}"/>
+              </a:ext>
+            </a:extLst>
+          </p:cNvPr>
+          <p:cNvSpPr/>
+          <p:nvPr/>
+        </p:nvSpPr>
+        <p:spPr>
+          <a:xfrm>
+            <a:off x="386499" y="1980220"/>
+            <a:ext cx="10989100" cy="685800"/>
+          </a:xfrm>
+          <a:prstGeom prst="rect">
+            <a:avLst/>
+          </a:prstGeom>
+        </p:spPr>
+        <p:style>
+          <a:lnRef idx="2">
+            <a:schemeClr val="accent1">
+              <a:shade val="50000"/>
+            </a:schemeClr>
+          </a:lnRef>
+          <a:fillRef idx="1">
+            <a:schemeClr val="accent1"/>
+          </a:fillRef>
+          <a:effectRef idx="0">
+            <a:schemeClr val="accent1"/>
+          </a:effectRef>
+          <a:fontRef idx="minor">
+            <a:schemeClr val="lt1"/>
+          </a:fontRef>
+        </p:style>
+        <p:txBody>
+          <a:bodyPr rtlCol="0" anchor="ctr"/>
+          <a:lstStyle/>
+          <a:p>
+            <a:r>
+              <a:rPr lang="en-US" dirty="0"/>
+              <a:t>Must use a converter to convert from the list of source properties to what the target expects</a:t>
+            </a:r>
+          </a:p>
+        </p:txBody>
+      </p:sp>
+      <p:sp>
+        <p:nvSpPr>
+          <p:cNvPr id="6" name="Rectangle 5">
+            <a:extLst>
+              <a:ext uri="{FF2B5EF4-FFF2-40B4-BE49-F238E27FC236}">
+                <a16:creationId xmlns:a16="http://schemas.microsoft.com/office/drawing/2014/main" id="{F73263C3-7578-5945-A296-B4508F7928AD}"/>
+              </a:ext>
+            </a:extLst>
+          </p:cNvPr>
+          <p:cNvSpPr/>
+          <p:nvPr/>
+        </p:nvSpPr>
+        <p:spPr>
+          <a:xfrm>
+            <a:off x="386499" y="2846995"/>
+            <a:ext cx="10989100" cy="685800"/>
+          </a:xfrm>
+          <a:prstGeom prst="rect">
+            <a:avLst/>
+          </a:prstGeom>
+        </p:spPr>
+        <p:style>
+          <a:lnRef idx="2">
+            <a:schemeClr val="accent1">
+              <a:shade val="50000"/>
+            </a:schemeClr>
+          </a:lnRef>
+          <a:fillRef idx="1">
+            <a:schemeClr val="accent1"/>
+          </a:fillRef>
+          <a:effectRef idx="0">
+            <a:schemeClr val="accent1"/>
+          </a:effectRef>
+          <a:fontRef idx="minor">
+            <a:schemeClr val="lt1"/>
+          </a:fontRef>
+        </p:style>
+        <p:txBody>
+          <a:bodyPr rtlCol="0" anchor="ctr"/>
+          <a:lstStyle/>
+          <a:p>
+            <a:r>
+              <a:rPr lang="en-US" dirty="0"/>
+              <a:t>Can be used bi-directionally in some instances</a:t>
+            </a:r>
+          </a:p>
+        </p:txBody>
+      </p:sp>
+      <p:sp>
+        <p:nvSpPr>
+          <p:cNvPr id="7" name="Rectangle 6">
+            <a:extLst>
+              <a:ext uri="{FF2B5EF4-FFF2-40B4-BE49-F238E27FC236}">
+                <a16:creationId xmlns:a16="http://schemas.microsoft.com/office/drawing/2014/main" id="{20032205-4941-E746-9186-4146CA3CE7D4}"/>
+              </a:ext>
+            </a:extLst>
+          </p:cNvPr>
+          <p:cNvSpPr/>
+          <p:nvPr/>
+        </p:nvSpPr>
+        <p:spPr>
+          <a:xfrm>
+            <a:off x="386499" y="3713770"/>
+            <a:ext cx="10989100" cy="685800"/>
+          </a:xfrm>
+          <a:prstGeom prst="rect">
+            <a:avLst/>
+          </a:prstGeom>
+        </p:spPr>
+        <p:style>
+          <a:lnRef idx="2">
+            <a:schemeClr val="accent1">
+              <a:shade val="50000"/>
+            </a:schemeClr>
+          </a:lnRef>
+          <a:fillRef idx="1">
+            <a:schemeClr val="accent1"/>
+          </a:fillRef>
+          <a:effectRef idx="0">
+            <a:schemeClr val="accent1"/>
+          </a:effectRef>
+          <a:fontRef idx="minor">
+            <a:schemeClr val="lt1"/>
+          </a:fontRef>
+        </p:style>
+        <p:txBody>
+          <a:bodyPr rtlCol="0" anchor="ctr"/>
+          <a:lstStyle/>
+          <a:p>
+            <a:r>
+              <a:rPr lang="en-US" dirty="0" err="1"/>
+              <a:t>ValueConverter</a:t>
+            </a:r>
+            <a:r>
+              <a:rPr lang="en-US" dirty="0"/>
+              <a:t> must inherit from </a:t>
+            </a:r>
+            <a:r>
+              <a:rPr lang="en-US" dirty="0" err="1"/>
+              <a:t>IMultiValueConverter</a:t>
+            </a:r>
+            <a:endParaRPr lang="en-US" dirty="0"/>
+          </a:p>
+        </p:txBody>
+      </p:sp>
+    </p:spTree>
+    <p:extLst>
+      <p:ext uri="{BB962C8B-B14F-4D97-AF65-F5344CB8AC3E}">
+        <p14:creationId xmlns:p14="http://schemas.microsoft.com/office/powerpoint/2010/main" val="3915877652"/>
+      </p:ext>
+    </p:extLst>
+  </p:cSld>
+  <p:clrMapOvr>
+    <a:masterClrMapping/>
+  </p:clrMapOvr>
+</p:sld>
+</file>
+
+<file path=ppt/slides/slide23.xml><?xml version="1.0" encoding="utf-8"?>
+<p:sld xmlns:a="http://schemas.openxmlformats.org/drawingml/2006/main" xmlns:r="http://schemas.openxmlformats.org/officeDocument/2006/relationships" xmlns:p="http://schemas.openxmlformats.org/presentationml/2006/main">
+  <p:cSld>
+    <p:spTree>
+      <p:nvGrpSpPr>
+        <p:cNvPr id="1" name=""/>
+        <p:cNvGrpSpPr/>
+        <p:nvPr/>
+      </p:nvGrpSpPr>
+      <p:grpSpPr>
+        <a:xfrm>
+          <a:off x="0" y="0"/>
+          <a:ext cx="0" cy="0"/>
+          <a:chOff x="0" y="0"/>
+          <a:chExt cx="0" cy="0"/>
+        </a:xfrm>
+      </p:grpSpPr>
+      <p:sp>
+        <p:nvSpPr>
+          <p:cNvPr id="2" name="Content Placeholder 1">
+            <a:extLst>
+              <a:ext uri="{FF2B5EF4-FFF2-40B4-BE49-F238E27FC236}">
+                <a16:creationId xmlns:a16="http://schemas.microsoft.com/office/drawing/2014/main" id="{3B3EA67C-6F4B-074D-977A-0F42659CC37A}"/>
+              </a:ext>
+            </a:extLst>
+          </p:cNvPr>
+          <p:cNvSpPr>
+            <a:spLocks noGrp="1"/>
+          </p:cNvSpPr>
+          <p:nvPr>
+            <p:ph idx="1"/>
+          </p:nvPr>
+        </p:nvSpPr>
+        <p:spPr/>
+        <p:txBody>
+          <a:bodyPr anchor="ctr"/>
+          <a:lstStyle/>
+          <a:p>
+            <a:pPr marL="0" indent="0" algn="ctr">
+              <a:buNone/>
+            </a:pPr>
+            <a:r>
+              <a:rPr lang="en-US" dirty="0"/>
+              <a:t>Demo 6: Multi-binding</a:t>
+            </a:r>
+          </a:p>
+        </p:txBody>
+      </p:sp>
+    </p:spTree>
+    <p:extLst>
+      <p:ext uri="{BB962C8B-B14F-4D97-AF65-F5344CB8AC3E}">
+        <p14:creationId xmlns:p14="http://schemas.microsoft.com/office/powerpoint/2010/main" val="1772793360"/>
+      </p:ext>
+    </p:extLst>
+  </p:cSld>
+  <p:clrMapOvr>
+    <a:masterClrMapping/>
+  </p:clrMapOvr>
+</p:sld>
+</file>
+
+<file path=ppt/slides/slide24.xml><?xml version="1.0" encoding="utf-8"?>
+<p:sld xmlns:a="http://schemas.openxmlformats.org/drawingml/2006/main" xmlns:r="http://schemas.openxmlformats.org/officeDocument/2006/relationships" xmlns:p="http://schemas.openxmlformats.org/presentationml/2006/main">
+  <p:cSld>
+    <p:spTree>
+      <p:nvGrpSpPr>
+        <p:cNvPr id="1" name=""/>
+        <p:cNvGrpSpPr/>
+        <p:nvPr/>
+      </p:nvGrpSpPr>
+      <p:grpSpPr>
+        <a:xfrm>
+          <a:off x="0" y="0"/>
+          <a:ext cx="0" cy="0"/>
+          <a:chOff x="0" y="0"/>
+          <a:chExt cx="0" cy="0"/>
+        </a:xfrm>
+      </p:grpSpPr>
+      <p:sp>
+        <p:nvSpPr>
+          <p:cNvPr id="3" name="Title 2">
+            <a:extLst>
+              <a:ext uri="{FF2B5EF4-FFF2-40B4-BE49-F238E27FC236}">
+                <a16:creationId xmlns:a16="http://schemas.microsoft.com/office/drawing/2014/main" id="{12132DEB-F44B-F748-8D8B-3293FA904F42}"/>
+              </a:ext>
+            </a:extLst>
+          </p:cNvPr>
+          <p:cNvSpPr>
+            <a:spLocks noGrp="1"/>
+          </p:cNvSpPr>
+          <p:nvPr>
+            <p:ph type="title"/>
+          </p:nvPr>
+        </p:nvSpPr>
+        <p:spPr/>
+        <p:txBody>
+          <a:bodyPr/>
+          <a:lstStyle/>
+          <a:p>
+            <a:r>
+              <a:rPr lang="en-US" dirty="0"/>
+              <a:t>Ancestor Bindings</a:t>
+            </a:r>
+          </a:p>
+        </p:txBody>
+      </p:sp>
+      <p:sp>
+        <p:nvSpPr>
+          <p:cNvPr id="4" name="Rectangle 3">
+            <a:extLst>
+              <a:ext uri="{FF2B5EF4-FFF2-40B4-BE49-F238E27FC236}">
+                <a16:creationId xmlns:a16="http://schemas.microsoft.com/office/drawing/2014/main" id="{5970B135-4A23-3E42-BF3B-0A8C06526693}"/>
+              </a:ext>
+            </a:extLst>
+          </p:cNvPr>
+          <p:cNvSpPr/>
+          <p:nvPr/>
+        </p:nvSpPr>
+        <p:spPr>
+          <a:xfrm>
+            <a:off x="386499" y="1113445"/>
+            <a:ext cx="10989100" cy="685800"/>
+          </a:xfrm>
+          <a:prstGeom prst="rect">
+            <a:avLst/>
+          </a:prstGeom>
+        </p:spPr>
+        <p:style>
+          <a:lnRef idx="2">
+            <a:schemeClr val="accent1">
+              <a:shade val="50000"/>
+            </a:schemeClr>
+          </a:lnRef>
+          <a:fillRef idx="1">
+            <a:schemeClr val="accent1"/>
+          </a:fillRef>
+          <a:effectRef idx="0">
+            <a:schemeClr val="accent1"/>
+          </a:effectRef>
+          <a:fontRef idx="minor">
+            <a:schemeClr val="lt1"/>
+          </a:fontRef>
+        </p:style>
+        <p:txBody>
+          <a:bodyPr rtlCol="0" anchor="ctr"/>
+          <a:lstStyle/>
+          <a:p>
+            <a:r>
+              <a:rPr lang="en-US" dirty="0"/>
+              <a:t>Allows to look up parent stack of views to find binding higher up</a:t>
+            </a:r>
+          </a:p>
+        </p:txBody>
+      </p:sp>
+      <p:sp>
+        <p:nvSpPr>
+          <p:cNvPr id="5" name="TextBox 4">
+            <a:extLst>
+              <a:ext uri="{FF2B5EF4-FFF2-40B4-BE49-F238E27FC236}">
+                <a16:creationId xmlns:a16="http://schemas.microsoft.com/office/drawing/2014/main" id="{0F5AE856-F4ED-7D49-AED7-31C737B8305B}"/>
+              </a:ext>
+            </a:extLst>
+          </p:cNvPr>
+          <p:cNvSpPr txBox="1"/>
+          <p:nvPr/>
+        </p:nvSpPr>
+        <p:spPr>
+          <a:xfrm>
+            <a:off x="1114425" y="1985963"/>
+            <a:ext cx="8858250" cy="1200329"/>
+          </a:xfrm>
+          <a:prstGeom prst="rect">
+            <a:avLst/>
+          </a:prstGeom>
+          <a:noFill/>
+        </p:spPr>
+        <p:txBody>
+          <a:bodyPr wrap="square" rtlCol="0">
+            <a:spAutoFit/>
+          </a:bodyPr>
+          <a:lstStyle/>
+          <a:p>
+            <a:r>
+              <a:rPr lang="en-US" dirty="0"/>
+              <a:t>Consider the case of a list of items where a collection of views are used to display each item in a list. Each one of these detail views is given a binding to a single item in the list. An ancestor binding allows that detail view to look for the parent list of items in the visual tree and bind to that.</a:t>
+            </a:r>
+          </a:p>
+        </p:txBody>
+      </p:sp>
+      <p:sp>
+        <p:nvSpPr>
+          <p:cNvPr id="6" name="Rectangle 5">
+            <a:extLst>
+              <a:ext uri="{FF2B5EF4-FFF2-40B4-BE49-F238E27FC236}">
+                <a16:creationId xmlns:a16="http://schemas.microsoft.com/office/drawing/2014/main" id="{DCB458AB-6D28-6F44-AF7D-63C5932444A3}"/>
+              </a:ext>
+            </a:extLst>
+          </p:cNvPr>
+          <p:cNvSpPr/>
+          <p:nvPr/>
+        </p:nvSpPr>
+        <p:spPr>
+          <a:xfrm>
+            <a:off x="386499" y="3373010"/>
+            <a:ext cx="10989100" cy="685800"/>
+          </a:xfrm>
+          <a:prstGeom prst="rect">
+            <a:avLst/>
+          </a:prstGeom>
+        </p:spPr>
+        <p:style>
+          <a:lnRef idx="2">
+            <a:schemeClr val="accent1">
+              <a:shade val="50000"/>
+            </a:schemeClr>
+          </a:lnRef>
+          <a:fillRef idx="1">
+            <a:schemeClr val="accent1"/>
+          </a:fillRef>
+          <a:effectRef idx="0">
+            <a:schemeClr val="accent1"/>
+          </a:effectRef>
+          <a:fontRef idx="minor">
+            <a:schemeClr val="lt1"/>
+          </a:fontRef>
+        </p:style>
+        <p:txBody>
+          <a:bodyPr rtlCol="0" anchor="ctr"/>
+          <a:lstStyle/>
+          <a:p>
+            <a:r>
+              <a:rPr lang="en-US" dirty="0"/>
+              <a:t>A type of </a:t>
+            </a:r>
+            <a:r>
+              <a:rPr lang="en-US" dirty="0" err="1"/>
+              <a:t>RelativeBinding</a:t>
+            </a:r>
+            <a:endParaRPr lang="en-US" dirty="0"/>
+          </a:p>
+        </p:txBody>
+      </p:sp>
+      <p:sp>
+        <p:nvSpPr>
+          <p:cNvPr id="7" name="Rectangle 6">
+            <a:extLst>
+              <a:ext uri="{FF2B5EF4-FFF2-40B4-BE49-F238E27FC236}">
+                <a16:creationId xmlns:a16="http://schemas.microsoft.com/office/drawing/2014/main" id="{0B06DE26-0D43-144D-95CF-8EFD36BA9FC0}"/>
+              </a:ext>
+            </a:extLst>
+          </p:cNvPr>
+          <p:cNvSpPr/>
+          <p:nvPr/>
+        </p:nvSpPr>
+        <p:spPr>
+          <a:xfrm>
+            <a:off x="386499" y="4245528"/>
+            <a:ext cx="10989100" cy="685800"/>
+          </a:xfrm>
+          <a:prstGeom prst="rect">
+            <a:avLst/>
+          </a:prstGeom>
+        </p:spPr>
+        <p:style>
+          <a:lnRef idx="2">
+            <a:schemeClr val="accent1">
+              <a:shade val="50000"/>
+            </a:schemeClr>
+          </a:lnRef>
+          <a:fillRef idx="1">
+            <a:schemeClr val="accent1"/>
+          </a:fillRef>
+          <a:effectRef idx="0">
+            <a:schemeClr val="accent1"/>
+          </a:effectRef>
+          <a:fontRef idx="minor">
+            <a:schemeClr val="lt1"/>
+          </a:fontRef>
+        </p:style>
+        <p:txBody>
+          <a:bodyPr rtlCol="0" anchor="ctr"/>
+          <a:lstStyle/>
+          <a:p>
+            <a:r>
+              <a:rPr lang="en-US" dirty="0"/>
+              <a:t>Matching done by type, </a:t>
+            </a:r>
+            <a:r>
+              <a:rPr lang="en-US" dirty="0" err="1"/>
+              <a:t>AncestorLevel</a:t>
+            </a:r>
+            <a:r>
+              <a:rPr lang="en-US" dirty="0"/>
+              <a:t> can be used if parents on the visual tree have multiple sources of the same type</a:t>
+            </a:r>
+          </a:p>
+        </p:txBody>
+      </p:sp>
+      <p:sp>
+        <p:nvSpPr>
+          <p:cNvPr id="8" name="TextBox 7">
+            <a:extLst>
+              <a:ext uri="{FF2B5EF4-FFF2-40B4-BE49-F238E27FC236}">
+                <a16:creationId xmlns:a16="http://schemas.microsoft.com/office/drawing/2014/main" id="{858FF0D8-9D50-D34E-858B-1E7521785FB2}"/>
+              </a:ext>
+            </a:extLst>
+          </p:cNvPr>
+          <p:cNvSpPr txBox="1"/>
+          <p:nvPr/>
+        </p:nvSpPr>
+        <p:spPr>
+          <a:xfrm>
+            <a:off x="498453" y="5744555"/>
+            <a:ext cx="10765191" cy="369332"/>
+          </a:xfrm>
+          <a:prstGeom prst="rect">
+            <a:avLst/>
+          </a:prstGeom>
+          <a:noFill/>
+        </p:spPr>
+        <p:txBody>
+          <a:bodyPr wrap="none" rtlCol="0">
+            <a:spAutoFit/>
+          </a:bodyPr>
+          <a:lstStyle/>
+          <a:p>
+            <a:r>
+              <a:rPr lang="en-US" dirty="0"/>
+              <a:t>&lt;Label Text="{Binding Source={</a:t>
+            </a:r>
+            <a:r>
+              <a:rPr lang="en-US" dirty="0" err="1"/>
+              <a:t>RelativeSource</a:t>
+            </a:r>
+            <a:r>
+              <a:rPr lang="en-US" dirty="0"/>
+              <a:t> </a:t>
+            </a:r>
+            <a:r>
+              <a:rPr lang="en-US" dirty="0" err="1"/>
+              <a:t>AncestorType</a:t>
+            </a:r>
+            <a:r>
+              <a:rPr lang="en-US" dirty="0"/>
+              <a:t>={</a:t>
+            </a:r>
+            <a:r>
+              <a:rPr lang="en-US" dirty="0" err="1"/>
+              <a:t>x:Type</a:t>
+            </a:r>
+            <a:r>
+              <a:rPr lang="en-US" dirty="0"/>
+              <a:t> Entry}, </a:t>
+            </a:r>
+            <a:r>
+              <a:rPr lang="en-US" dirty="0" err="1"/>
+              <a:t>AncestorLevel</a:t>
+            </a:r>
+            <a:r>
+              <a:rPr lang="en-US" dirty="0"/>
+              <a:t>=2}, Path=Text}" /&gt;</a:t>
+            </a:r>
+          </a:p>
+        </p:txBody>
+      </p:sp>
+      <p:sp>
+        <p:nvSpPr>
+          <p:cNvPr id="9" name="Rectangle 8">
+            <a:extLst>
+              <a:ext uri="{FF2B5EF4-FFF2-40B4-BE49-F238E27FC236}">
+                <a16:creationId xmlns:a16="http://schemas.microsoft.com/office/drawing/2014/main" id="{0DC8C825-BE7F-1A47-BEEC-25A7444CA37F}"/>
+              </a:ext>
+            </a:extLst>
+          </p:cNvPr>
+          <p:cNvSpPr/>
+          <p:nvPr/>
+        </p:nvSpPr>
+        <p:spPr>
+          <a:xfrm>
+            <a:off x="386498" y="5118046"/>
+            <a:ext cx="10989100" cy="685800"/>
+          </a:xfrm>
+          <a:prstGeom prst="rect">
+            <a:avLst/>
+          </a:prstGeom>
+        </p:spPr>
+        <p:style>
+          <a:lnRef idx="2">
+            <a:schemeClr val="accent1">
+              <a:shade val="50000"/>
+            </a:schemeClr>
+          </a:lnRef>
+          <a:fillRef idx="1">
+            <a:schemeClr val="accent1"/>
+          </a:fillRef>
+          <a:effectRef idx="0">
+            <a:schemeClr val="accent1"/>
+          </a:effectRef>
+          <a:fontRef idx="minor">
+            <a:schemeClr val="lt1"/>
+          </a:fontRef>
+        </p:style>
+        <p:txBody>
+          <a:bodyPr rtlCol="0" anchor="ctr"/>
+          <a:lstStyle/>
+          <a:p>
+            <a:r>
+              <a:rPr lang="en-US" dirty="0"/>
+              <a:t>Works with any source in the visual tree, including views and layouts</a:t>
+            </a:r>
+          </a:p>
+        </p:txBody>
+      </p:sp>
+    </p:spTree>
+    <p:extLst>
+      <p:ext uri="{BB962C8B-B14F-4D97-AF65-F5344CB8AC3E}">
+        <p14:creationId xmlns:p14="http://schemas.microsoft.com/office/powerpoint/2010/main" val="2214737356"/>
+      </p:ext>
+    </p:extLst>
+  </p:cSld>
+  <p:clrMapOvr>
+    <a:masterClrMapping/>
+  </p:clrMapOvr>
+</p:sld>
+</file>
+
+<file path=ppt/slides/slide25.xml><?xml version="1.0" encoding="utf-8"?>
+<p:sld xmlns:a="http://schemas.openxmlformats.org/drawingml/2006/main" xmlns:r="http://schemas.openxmlformats.org/officeDocument/2006/relationships" xmlns:p="http://schemas.openxmlformats.org/presentationml/2006/main">
+  <p:cSld>
+    <p:spTree>
+      <p:nvGrpSpPr>
+        <p:cNvPr id="1" name=""/>
+        <p:cNvGrpSpPr/>
+        <p:nvPr/>
+      </p:nvGrpSpPr>
+      <p:grpSpPr>
+        <a:xfrm>
+          <a:off x="0" y="0"/>
+          <a:ext cx="0" cy="0"/>
+          <a:chOff x="0" y="0"/>
+          <a:chExt cx="0" cy="0"/>
+        </a:xfrm>
+      </p:grpSpPr>
+      <p:sp>
+        <p:nvSpPr>
+          <p:cNvPr id="2" name="Content Placeholder 1">
+            <a:extLst>
+              <a:ext uri="{FF2B5EF4-FFF2-40B4-BE49-F238E27FC236}">
+                <a16:creationId xmlns:a16="http://schemas.microsoft.com/office/drawing/2014/main" id="{1C477145-6662-8147-9CC9-822B3280FF0D}"/>
+              </a:ext>
+            </a:extLst>
+          </p:cNvPr>
+          <p:cNvSpPr>
+            <a:spLocks noGrp="1"/>
+          </p:cNvSpPr>
+          <p:nvPr>
+            <p:ph idx="1"/>
+          </p:nvPr>
+        </p:nvSpPr>
+        <p:spPr/>
+        <p:txBody>
+          <a:bodyPr/>
+          <a:lstStyle/>
+          <a:p>
+            <a:r>
+              <a:rPr lang="en-US" dirty="0"/>
+              <a:t>Work with Bindings</a:t>
+            </a:r>
+          </a:p>
+        </p:txBody>
+      </p:sp>
+      <p:sp>
+        <p:nvSpPr>
+          <p:cNvPr id="3" name="Title 2">
+            <a:extLst>
+              <a:ext uri="{FF2B5EF4-FFF2-40B4-BE49-F238E27FC236}">
+                <a16:creationId xmlns:a16="http://schemas.microsoft.com/office/drawing/2014/main" id="{934B4579-82D0-4845-952F-27348A280FF2}"/>
+              </a:ext>
+            </a:extLst>
+          </p:cNvPr>
+          <p:cNvSpPr>
+            <a:spLocks noGrp="1"/>
+          </p:cNvSpPr>
+          <p:nvPr>
+            <p:ph type="title"/>
+          </p:nvPr>
+        </p:nvSpPr>
+        <p:spPr/>
+        <p:txBody>
+          <a:bodyPr/>
+          <a:lstStyle/>
+          <a:p>
+            <a:r>
+              <a:rPr lang="en-US" dirty="0"/>
+              <a:t>Homework</a:t>
+            </a:r>
+          </a:p>
+        </p:txBody>
+      </p:sp>
+    </p:spTree>
+    <p:extLst>
+      <p:ext uri="{BB962C8B-B14F-4D97-AF65-F5344CB8AC3E}">
+        <p14:creationId xmlns:p14="http://schemas.microsoft.com/office/powerpoint/2010/main" val="3350403717"/>
+      </p:ext>
+    </p:extLst>
+  </p:cSld>
+  <p:clrMapOvr>
+    <a:masterClrMapping/>
+  </p:clrMapOvr>
+</p:sld>
+</file>
+
+<file path=ppt/slides/slide26.xml><?xml version="1.0" encoding="utf-8"?>
+<p:sld xmlns:a="http://schemas.openxmlformats.org/drawingml/2006/main" xmlns:r="http://schemas.openxmlformats.org/officeDocument/2006/relationships" xmlns:p="http://schemas.openxmlformats.org/presentationml/2006/main">
+  <p:cSld>
+    <p:spTree>
+      <p:nvGrpSpPr>
+        <p:cNvPr id="1" name=""/>
+        <p:cNvGrpSpPr/>
+        <p:nvPr/>
+      </p:nvGrpSpPr>
+      <p:grpSpPr>
+        <a:xfrm>
+          <a:off x="0" y="0"/>
+          <a:ext cx="0" cy="0"/>
+          <a:chOff x="0" y="0"/>
+          <a:chExt cx="0" cy="0"/>
+        </a:xfrm>
+      </p:grpSpPr>
+      <p:sp>
+        <p:nvSpPr>
+          <p:cNvPr id="2" name="Title 1">
+            <a:extLst>
+              <a:ext uri="{FF2B5EF4-FFF2-40B4-BE49-F238E27FC236}">
+                <a16:creationId xmlns:a16="http://schemas.microsoft.com/office/drawing/2014/main" id="{806D7A72-3239-5742-844A-0446DAEC6607}"/>
+              </a:ext>
+            </a:extLst>
+          </p:cNvPr>
+          <p:cNvSpPr>
+            <a:spLocks noGrp="1"/>
+          </p:cNvSpPr>
+          <p:nvPr>
+            <p:ph type="title"/>
+          </p:nvPr>
+        </p:nvSpPr>
+        <p:spPr/>
+        <p:txBody>
+          <a:bodyPr/>
+          <a:lstStyle/>
+          <a:p>
+            <a:endParaRPr lang="en-US"/>
+          </a:p>
+        </p:txBody>
+      </p:sp>
+      <p:sp>
+        <p:nvSpPr>
+          <p:cNvPr id="3" name="Content Placeholder 2">
+            <a:extLst>
+              <a:ext uri="{FF2B5EF4-FFF2-40B4-BE49-F238E27FC236}">
+                <a16:creationId xmlns:a16="http://schemas.microsoft.com/office/drawing/2014/main" id="{CB53C791-741A-D840-B1AE-33245AF3112C}"/>
+              </a:ext>
+            </a:extLst>
+          </p:cNvPr>
+          <p:cNvSpPr>
+            <a:spLocks noGrp="1"/>
+          </p:cNvSpPr>
+          <p:nvPr>
+            <p:ph idx="1"/>
+          </p:nvPr>
+        </p:nvSpPr>
+        <p:spPr/>
+        <p:txBody>
+          <a:bodyPr/>
+          <a:lstStyle/>
+          <a:p>
+            <a:r>
+              <a:rPr lang="en-US" dirty="0"/>
+              <a:t>Q &amp; A</a:t>
+            </a:r>
+          </a:p>
+          <a:p>
+            <a:endParaRPr lang="en-US" dirty="0"/>
+          </a:p>
+          <a:p>
+            <a:r>
+              <a:rPr lang="en-US" dirty="0"/>
+              <a:t>Next week – Binding</a:t>
+            </a:r>
+          </a:p>
+        </p:txBody>
+      </p:sp>
+    </p:spTree>
+    <p:extLst>
+      <p:ext uri="{BB962C8B-B14F-4D97-AF65-F5344CB8AC3E}">
+        <p14:creationId xmlns:p14="http://schemas.microsoft.com/office/powerpoint/2010/main" val="1493233687"/>
+      </p:ext>
+    </p:extLst>
+  </p:cSld>
+  <p:clrMapOvr>
+    <a:masterClrMapping/>
+  </p:clrMapOvr>
+</p:sld>
+</file>
+
 <file path=ppt/slides/slide3.xml><?xml version="1.0" encoding="utf-8"?>
 <p:sld xmlns:a="http://schemas.openxmlformats.org/drawingml/2006/main" xmlns:r="http://schemas.openxmlformats.org/officeDocument/2006/relationships" xmlns:p="http://schemas.openxmlformats.org/presentationml/2006/main">
   <p:cSld>
@@ -6520,7 +9040,7 @@
           <a:p>
             <a:r>
               <a:rPr lang="en-US" dirty="0"/>
-              <a:t>Binding to lists and complex objects</a:t>
+              <a:t>Binding to lists</a:t>
             </a:r>
           </a:p>
         </p:txBody>

</xml_diff>

<commit_message>
Week 5 presentation and samples
</commit_message>
<xml_diff>
--- a/presentations/XamarinForms-Week4.pptx
+++ b/presentations/XamarinForms-Week4.pptx
@@ -236,7 +236,7 @@
           <a:p>
             <a:fld id="{9ECE5BDF-9B7E-3646-B6C9-FC2C3E116129}" type="datetimeFigureOut">
               <a:rPr lang="en-US" smtClean="0"/>
-              <a:t>3/17/21</a:t>
+              <a:t>3/18/21</a:t>
             </a:fld>
             <a:endParaRPr lang="en-US"/>
           </a:p>
@@ -1823,7 +1823,7 @@
               <a:pPr>
                 <a:defRPr/>
               </a:pPr>
-              <a:t>3/17/21</a:t>
+              <a:t>3/18/21</a:t>
             </a:fld>
             <a:endParaRPr lang="en-US" dirty="0"/>
           </a:p>
@@ -10096,7 +10096,7 @@
             </a:r>
             <a:r>
               <a:rPr lang="en-US" dirty="0" err="1"/>
-              <a:t>CindingContext</a:t>
+              <a:t>BindingContext</a:t>
             </a:r>
             <a:endParaRPr lang="en-US" dirty="0"/>
           </a:p>
@@ -12654,18 +12654,18 @@
 </file>
 
 <file path=customXml/item1.xml><?xml version="1.0" encoding="utf-8"?>
-<p:properties xmlns:p="http://schemas.microsoft.com/office/2006/metadata/properties" xmlns:xsi="http://www.w3.org/2001/XMLSchema-instance" xmlns:pc="http://schemas.microsoft.com/office/infopath/2007/PartnerControls">
-  <documentManagement/>
-</p:properties>
-</file>
-
-<file path=customXml/item2.xml><?xml version="1.0" encoding="utf-8"?>
 <?mso-contentType ?>
 <FormTemplates xmlns="http://schemas.microsoft.com/sharepoint/v3/contenttype/forms">
   <Display>DocumentLibraryForm</Display>
   <Edit>DocumentLibraryForm</Edit>
   <New>DocumentLibraryForm</New>
 </FormTemplates>
+</file>
+
+<file path=customXml/item2.xml><?xml version="1.0" encoding="utf-8"?>
+<p:properties xmlns:p="http://schemas.microsoft.com/office/2006/metadata/properties" xmlns:xsi="http://www.w3.org/2001/XMLSchema-instance" xmlns:pc="http://schemas.microsoft.com/office/infopath/2007/PartnerControls">
+  <documentManagement/>
+</p:properties>
 </file>
 
 <file path=customXml/item3.xml><?xml version="1.0" encoding="utf-8"?>
@@ -12872,6 +12872,14 @@
 </file>
 
 <file path=customXml/itemProps1.xml><?xml version="1.0" encoding="utf-8"?>
+<ds:datastoreItem xmlns:ds="http://schemas.openxmlformats.org/officeDocument/2006/customXml" ds:itemID="{D18D97D8-3C52-47EE-88EC-CF46155D7428}">
+  <ds:schemaRefs>
+    <ds:schemaRef ds:uri="http://schemas.microsoft.com/sharepoint/v3/contenttype/forms"/>
+  </ds:schemaRefs>
+</ds:datastoreItem>
+</file>
+
+<file path=customXml/itemProps2.xml><?xml version="1.0" encoding="utf-8"?>
 <ds:datastoreItem xmlns:ds="http://schemas.openxmlformats.org/officeDocument/2006/customXml" ds:itemID="{65A3A91F-3324-4EE4-8BF2-C3B78E1D1674}">
   <ds:schemaRefs>
     <ds:schemaRef ds:uri="9dc32095-d95f-42cf-993f-bcc1f153f49e"/>
@@ -12883,14 +12891,6 @@
     <ds:schemaRef ds:uri="http://schemas.microsoft.com/office/infopath/2007/PartnerControls"/>
     <ds:schemaRef ds:uri="http://schemas.openxmlformats.org/package/2006/metadata/core-properties"/>
     <ds:schemaRef ds:uri="http://www.w3.org/XML/1998/namespace"/>
-  </ds:schemaRefs>
-</ds:datastoreItem>
-</file>
-
-<file path=customXml/itemProps2.xml><?xml version="1.0" encoding="utf-8"?>
-<ds:datastoreItem xmlns:ds="http://schemas.openxmlformats.org/officeDocument/2006/customXml" ds:itemID="{D18D97D8-3C52-47EE-88EC-CF46155D7428}">
-  <ds:schemaRefs>
-    <ds:schemaRef ds:uri="http://schemas.microsoft.com/sharepoint/v3/contenttype/forms"/>
   </ds:schemaRefs>
 </ds:datastoreItem>
 </file>

</xml_diff>